<commit_message>
Depot de presentation PPT
</commit_message>
<xml_diff>
--- a/Prédiction de la Consommation Électrique.pptx
+++ b/Prédiction de la Consommation Électrique.pptx
@@ -25751,7 +25751,7 @@
         </p:nvSpPr>
         <p:spPr>
           <a:xfrm>
-            <a:off x="8062139" y="1633085"/>
+            <a:off x="3286637" y="5663674"/>
             <a:ext cx="687945" cy="375680"/>
           </a:xfrm>
           <a:prstGeom prst="rect">
@@ -25811,7 +25811,7 @@
         </p:nvSpPr>
         <p:spPr>
           <a:xfrm>
-            <a:off x="8942765" y="1499769"/>
+            <a:off x="4167263" y="5530358"/>
             <a:ext cx="2117824" cy="296107"/>
           </a:xfrm>
           <a:prstGeom prst="rect">
@@ -25856,7 +25856,7 @@
         </p:nvSpPr>
         <p:spPr>
           <a:xfrm>
-            <a:off x="8942765" y="1753603"/>
+            <a:off x="4167263" y="5784192"/>
             <a:ext cx="1912639" cy="264688"/>
           </a:xfrm>
           <a:prstGeom prst="rect">
@@ -26105,7 +26105,7 @@
         </p:nvSpPr>
         <p:spPr>
           <a:xfrm>
-            <a:off x="8062139" y="2385561"/>
+            <a:off x="8198992" y="1676223"/>
             <a:ext cx="681533" cy="375680"/>
           </a:xfrm>
           <a:prstGeom prst="rect">
@@ -26165,7 +26165,7 @@
         </p:nvSpPr>
         <p:spPr>
           <a:xfrm>
-            <a:off x="8942765" y="2252243"/>
+            <a:off x="9079618" y="1542905"/>
             <a:ext cx="2268506" cy="296107"/>
           </a:xfrm>
           <a:prstGeom prst="rect">
@@ -26210,7 +26210,7 @@
         </p:nvSpPr>
         <p:spPr>
           <a:xfrm>
-            <a:off x="8942765" y="2506078"/>
+            <a:off x="9079618" y="1796740"/>
             <a:ext cx="1973554" cy="264688"/>
           </a:xfrm>
           <a:prstGeom prst="rect">
@@ -26399,7 +26399,7 @@
         </p:nvSpPr>
         <p:spPr>
           <a:xfrm>
-            <a:off x="8083331" y="4071488"/>
+            <a:off x="8220184" y="3362150"/>
             <a:ext cx="687945" cy="375680"/>
           </a:xfrm>
           <a:prstGeom prst="rect">
@@ -26444,7 +26444,7 @@
         </p:nvSpPr>
         <p:spPr>
           <a:xfrm>
-            <a:off x="8963957" y="3938171"/>
+            <a:off x="9100810" y="3228833"/>
             <a:ext cx="1271438" cy="296107"/>
           </a:xfrm>
           <a:prstGeom prst="rect">
@@ -26470,7 +26470,7 @@
               </a:spcAft>
             </a:pPr>
             <a:r>
-              <a:rPr sz="1600" b="1">
+              <a:rPr sz="1600" b="1" dirty="0" err="1">
                 <a:solidFill>
                   <a:srgbClr val="424242"/>
                 </a:solidFill>
@@ -26478,6 +26478,12 @@
               </a:rPr>
               <a:t>Prédiction</a:t>
             </a:r>
+            <a:endParaRPr sz="1600" b="1" dirty="0">
+              <a:solidFill>
+                <a:srgbClr val="424242"/>
+              </a:solidFill>
+              <a:latin typeface="Montserrat"/>
+            </a:endParaRPr>
           </a:p>
         </p:txBody>
       </p:sp>
@@ -26489,7 +26495,7 @@
         </p:nvSpPr>
         <p:spPr>
           <a:xfrm>
-            <a:off x="8963957" y="4182481"/>
+            <a:off x="9100810" y="3473143"/>
             <a:ext cx="1535933" cy="264688"/>
           </a:xfrm>
           <a:prstGeom prst="rect">
@@ -26534,7 +26540,7 @@
         </p:nvSpPr>
         <p:spPr>
           <a:xfrm>
-            <a:off x="8151208" y="4807573"/>
+            <a:off x="8288061" y="4098235"/>
             <a:ext cx="586956" cy="375680"/>
           </a:xfrm>
           <a:prstGeom prst="rect">
@@ -26579,8 +26585,8 @@
         </p:nvSpPr>
         <p:spPr>
           <a:xfrm>
-            <a:off x="8963957" y="4690647"/>
-            <a:ext cx="2659639" cy="296107"/>
+            <a:off x="9100810" y="3981309"/>
+            <a:ext cx="939616" cy="296107"/>
           </a:xfrm>
           <a:prstGeom prst="rect">
             <a:avLst/>
@@ -26605,59 +26611,20 @@
               </a:spcAft>
             </a:pPr>
             <a:r>
-              <a:rPr sz="1600" b="1">
+              <a:rPr lang="fr-FR" sz="1600" b="1" dirty="0">
                 <a:solidFill>
                   <a:srgbClr val="424242"/>
                 </a:solidFill>
                 <a:latin typeface="Montserrat"/>
               </a:rPr>
-              <a:t>Limites et Perspectives</a:t>
-            </a:r>
-          </a:p>
-        </p:txBody>
-      </p:sp>
-      <p:sp>
-        <p:nvSpPr>
-          <p:cNvPr id="39" name="TextBox 38"/>
-          <p:cNvSpPr txBox="1"/>
-          <p:nvPr/>
-        </p:nvSpPr>
-        <p:spPr>
-          <a:xfrm>
-            <a:off x="8963957" y="4934956"/>
-            <a:ext cx="1471813" cy="264688"/>
-          </a:xfrm>
-          <a:prstGeom prst="rect">
-            <a:avLst/>
-          </a:prstGeom>
-          <a:noFill/>
-        </p:spPr>
-        <p:txBody>
-          <a:bodyPr wrap="none" lIns="73152" tIns="54864" rIns="73152" bIns="54864" anchor="ctr">
-            <a:spAutoFit/>
-          </a:bodyPr>
-          <a:lstStyle/>
-          <a:p>
-            <a:pPr algn="l">
-              <a:lnSpc>
-                <a:spcPts val="1235"/>
-              </a:lnSpc>
-              <a:spcBef>
-                <a:spcPts val="0"/>
-              </a:spcBef>
-              <a:spcAft>
-                <a:spcPts val="0"/>
-              </a:spcAft>
-            </a:pPr>
-            <a:r>
-              <a:rPr sz="1050" b="0">
-                <a:solidFill>
-                  <a:srgbClr val="9E9E9E"/>
-                </a:solidFill>
-                <a:latin typeface="Montserrat"/>
-              </a:rPr>
-              <a:t>Recommandations</a:t>
-            </a:r>
+              <a:t>Limites</a:t>
+            </a:r>
+            <a:endParaRPr sz="1600" b="1" dirty="0">
+              <a:solidFill>
+                <a:srgbClr val="424242"/>
+              </a:solidFill>
+              <a:latin typeface="Montserrat"/>
+            </a:endParaRPr>
           </a:p>
         </p:txBody>
       </p:sp>
@@ -26675,7 +26642,7 @@
         </p:nvSpPr>
         <p:spPr>
           <a:xfrm>
-            <a:off x="8062140" y="3147563"/>
+            <a:off x="8198993" y="2438225"/>
             <a:ext cx="697563" cy="375680"/>
           </a:xfrm>
           <a:prstGeom prst="rect">
@@ -26741,7 +26708,7 @@
         </p:nvSpPr>
         <p:spPr>
           <a:xfrm>
-            <a:off x="8942765" y="3014246"/>
+            <a:off x="9079618" y="2304908"/>
             <a:ext cx="1577611" cy="296107"/>
           </a:xfrm>
           <a:prstGeom prst="rect">
@@ -26792,7 +26759,7 @@
         </p:nvSpPr>
         <p:spPr>
           <a:xfrm>
-            <a:off x="8942765" y="3258555"/>
+            <a:off x="9079618" y="2549217"/>
             <a:ext cx="1866152" cy="264688"/>
           </a:xfrm>
           <a:prstGeom prst="rect">
@@ -26881,8 +26848,8 @@
         </p:nvSpPr>
         <p:spPr>
           <a:xfrm>
-            <a:off x="6027597" y="5770004"/>
-            <a:ext cx="468333" cy="375680"/>
+            <a:off x="8304612" y="5475834"/>
+            <a:ext cx="550087" cy="375680"/>
           </a:xfrm>
           <a:prstGeom prst="rect">
             <a:avLst/>
@@ -26926,7 +26893,7 @@
                 </a:solidFill>
                 <a:latin typeface="Montserrat"/>
               </a:rPr>
-              <a:t>1</a:t>
+              <a:t>2</a:t>
             </a:r>
             <a:endParaRPr sz="3200" b="1" dirty="0">
               <a:solidFill>
@@ -26953,7 +26920,7 @@
         </p:nvSpPr>
         <p:spPr>
           <a:xfrm>
-            <a:off x="6587652" y="5762899"/>
+            <a:off x="8864667" y="5468729"/>
             <a:ext cx="1346779" cy="296107"/>
           </a:xfrm>
           <a:prstGeom prst="rect">
@@ -26993,6 +26960,174 @@
               </a:solidFill>
               <a:latin typeface="Montserrat"/>
             </a:endParaRPr>
+          </a:p>
+        </p:txBody>
+      </p:sp>
+      <p:sp>
+        <p:nvSpPr>
+          <p:cNvPr id="40" name="TextBox 36">
+            <a:extLst>
+              <a:ext uri="{FF2B5EF4-FFF2-40B4-BE49-F238E27FC236}">
+                <a16:creationId xmlns:a16="http://schemas.microsoft.com/office/drawing/2014/main" id="{FB0F9D8D-91C7-32BA-288F-6ED8B1585804}"/>
+              </a:ext>
+            </a:extLst>
+          </p:cNvPr>
+          <p:cNvSpPr txBox="1"/>
+          <p:nvPr/>
+        </p:nvSpPr>
+        <p:spPr>
+          <a:xfrm>
+            <a:off x="8309600" y="4749287"/>
+            <a:ext cx="468333" cy="375680"/>
+          </a:xfrm>
+          <a:prstGeom prst="rect">
+            <a:avLst/>
+          </a:prstGeom>
+          <a:noFill/>
+        </p:spPr>
+        <p:txBody>
+          <a:bodyPr wrap="none" lIns="73152" tIns="54864" rIns="73152" bIns="54864" anchor="ctr">
+            <a:spAutoFit/>
+          </a:bodyPr>
+          <a:lstStyle/>
+          <a:p>
+            <a:pPr algn="l">
+              <a:lnSpc>
+                <a:spcPts val="1690"/>
+              </a:lnSpc>
+              <a:spcBef>
+                <a:spcPts val="0"/>
+              </a:spcBef>
+              <a:spcAft>
+                <a:spcPts val="0"/>
+              </a:spcAft>
+            </a:pPr>
+            <a:r>
+              <a:rPr sz="3200" b="1" dirty="0">
+                <a:solidFill>
+                  <a:srgbClr val="AB47BC"/>
+                </a:solidFill>
+                <a:latin typeface="Montserrat"/>
+              </a:rPr>
+              <a:t>1</a:t>
+            </a:r>
+            <a:r>
+              <a:rPr lang="fr-FR" sz="3200" b="1" dirty="0">
+                <a:solidFill>
+                  <a:srgbClr val="AB47BC"/>
+                </a:solidFill>
+                <a:latin typeface="Montserrat"/>
+              </a:rPr>
+              <a:t>1</a:t>
+            </a:r>
+            <a:endParaRPr sz="3200" b="1" dirty="0">
+              <a:solidFill>
+                <a:srgbClr val="AB47BC"/>
+              </a:solidFill>
+              <a:latin typeface="Montserrat"/>
+            </a:endParaRPr>
+          </a:p>
+        </p:txBody>
+      </p:sp>
+      <p:sp>
+        <p:nvSpPr>
+          <p:cNvPr id="41" name="TextBox 37">
+            <a:extLst>
+              <a:ext uri="{FF2B5EF4-FFF2-40B4-BE49-F238E27FC236}">
+                <a16:creationId xmlns:a16="http://schemas.microsoft.com/office/drawing/2014/main" id="{DBE6896A-23BC-429C-04BD-C251AE717BA4}"/>
+              </a:ext>
+            </a:extLst>
+          </p:cNvPr>
+          <p:cNvSpPr txBox="1"/>
+          <p:nvPr/>
+        </p:nvSpPr>
+        <p:spPr>
+          <a:xfrm>
+            <a:off x="9122349" y="4632361"/>
+            <a:ext cx="1532727" cy="296107"/>
+          </a:xfrm>
+          <a:prstGeom prst="rect">
+            <a:avLst/>
+          </a:prstGeom>
+          <a:noFill/>
+        </p:spPr>
+        <p:txBody>
+          <a:bodyPr wrap="none" lIns="73152" tIns="54864" rIns="73152" bIns="54864" anchor="ctr">
+            <a:spAutoFit/>
+          </a:bodyPr>
+          <a:lstStyle/>
+          <a:p>
+            <a:pPr algn="l">
+              <a:lnSpc>
+                <a:spcPts val="1365"/>
+              </a:lnSpc>
+              <a:spcBef>
+                <a:spcPts val="0"/>
+              </a:spcBef>
+              <a:spcAft>
+                <a:spcPts val="260"/>
+              </a:spcAft>
+            </a:pPr>
+            <a:r>
+              <a:rPr sz="1600" b="1" dirty="0">
+                <a:solidFill>
+                  <a:srgbClr val="424242"/>
+                </a:solidFill>
+                <a:latin typeface="Montserrat"/>
+              </a:rPr>
+              <a:t>Perspectives</a:t>
+            </a:r>
+          </a:p>
+        </p:txBody>
+      </p:sp>
+      <p:sp>
+        <p:nvSpPr>
+          <p:cNvPr id="42" name="TextBox 38">
+            <a:extLst>
+              <a:ext uri="{FF2B5EF4-FFF2-40B4-BE49-F238E27FC236}">
+                <a16:creationId xmlns:a16="http://schemas.microsoft.com/office/drawing/2014/main" id="{E19D345D-E6CF-45D2-C4C9-A796A9AF84C4}"/>
+              </a:ext>
+            </a:extLst>
+          </p:cNvPr>
+          <p:cNvSpPr txBox="1"/>
+          <p:nvPr/>
+        </p:nvSpPr>
+        <p:spPr>
+          <a:xfrm>
+            <a:off x="9122349" y="4876670"/>
+            <a:ext cx="1471813" cy="264688"/>
+          </a:xfrm>
+          <a:prstGeom prst="rect">
+            <a:avLst/>
+          </a:prstGeom>
+          <a:noFill/>
+        </p:spPr>
+        <p:txBody>
+          <a:bodyPr wrap="none" lIns="73152" tIns="54864" rIns="73152" bIns="54864" anchor="ctr">
+            <a:spAutoFit/>
+          </a:bodyPr>
+          <a:lstStyle/>
+          <a:p>
+            <a:pPr algn="l">
+              <a:lnSpc>
+                <a:spcPts val="1235"/>
+              </a:lnSpc>
+              <a:spcBef>
+                <a:spcPts val="0"/>
+              </a:spcBef>
+              <a:spcAft>
+                <a:spcPts val="0"/>
+              </a:spcAft>
+            </a:pPr>
+            <a:r>
+              <a:rPr sz="1050" b="0">
+                <a:solidFill>
+                  <a:srgbClr val="9E9E9E"/>
+                </a:solidFill>
+                <a:latin typeface="Montserrat"/>
+              </a:rPr>
+              <a:t>Recommandations</a:t>
+            </a:r>
           </a:p>
         </p:txBody>
       </p:sp>

</xml_diff>

<commit_message>
Ajout de la video
</commit_message>
<xml_diff>
--- a/Prédiction de la Consommation Électrique.pptx
+++ b/Prédiction de la Consommation Électrique.pptx
@@ -5,7 +5,7 @@
     <p:sldMasterId id="2147483648" r:id="rId1"/>
   </p:sldMasterIdLst>
   <p:notesMasterIdLst>
-    <p:notesMasterId r:id="rId26"/>
+    <p:notesMasterId r:id="rId27"/>
   </p:notesMasterIdLst>
   <p:sldIdLst>
     <p:sldId id="256" r:id="rId2"/>
@@ -32,6 +32,7 @@
     <p:sldId id="280" r:id="rId23"/>
     <p:sldId id="277" r:id="rId24"/>
     <p:sldId id="278" r:id="rId25"/>
+    <p:sldId id="281" r:id="rId26"/>
   </p:sldIdLst>
   <p:sldSz cx="12192000" cy="6858000"/>
   <p:notesSz cx="6858000" cy="9144000"/>
@@ -231,7 +232,7 @@
           <a:p>
             <a:fld id="{76D07B07-2C59-4B7F-B014-A7C1F1DEF2DC}" type="datetimeFigureOut">
               <a:rPr lang="fr-FR" smtClean="0"/>
-              <a:t>31/01/2026</a:t>
+              <a:t>01/02/2026</a:t>
             </a:fld>
             <a:endParaRPr lang="fr-FR"/>
           </a:p>
@@ -1993,6 +1994,94 @@
 </p:notes>
 </file>
 
+<file path=ppt/notesSlides/notesSlide25.xml><?xml version="1.0" encoding="utf-8"?>
+<p:notes xmlns:a="http://schemas.openxmlformats.org/drawingml/2006/main" xmlns:r="http://schemas.openxmlformats.org/officeDocument/2006/relationships" xmlns:p="http://schemas.openxmlformats.org/presentationml/2006/main">
+  <p:cSld>
+    <p:spTree>
+      <p:nvGrpSpPr>
+        <p:cNvPr id="1" name=""/>
+        <p:cNvGrpSpPr/>
+        <p:nvPr/>
+      </p:nvGrpSpPr>
+      <p:grpSpPr>
+        <a:xfrm>
+          <a:off x="0" y="0"/>
+          <a:ext cx="0" cy="0"/>
+          <a:chOff x="0" y="0"/>
+          <a:chExt cx="0" cy="0"/>
+        </a:xfrm>
+      </p:grpSpPr>
+      <p:sp>
+        <p:nvSpPr>
+          <p:cNvPr id="2" name="Espace réservé de l'image des diapositives 1"/>
+          <p:cNvSpPr>
+            <a:spLocks noGrp="1" noRot="1" noChangeAspect="1"/>
+          </p:cNvSpPr>
+          <p:nvPr>
+            <p:ph type="sldImg"/>
+          </p:nvPr>
+        </p:nvSpPr>
+        <p:spPr/>
+      </p:sp>
+      <p:sp>
+        <p:nvSpPr>
+          <p:cNvPr id="3" name="Espace réservé des notes 2"/>
+          <p:cNvSpPr>
+            <a:spLocks noGrp="1"/>
+          </p:cNvSpPr>
+          <p:nvPr>
+            <p:ph type="body" idx="1"/>
+          </p:nvPr>
+        </p:nvSpPr>
+        <p:spPr/>
+        <p:txBody>
+          <a:bodyPr/>
+          <a:lstStyle/>
+          <a:p>
+            <a:r>
+              <a:rPr lang="fr-FR" dirty="0" err="1"/>
+              <a:t>imane</a:t>
+            </a:r>
+            <a:endParaRPr lang="fr-FR" dirty="0"/>
+          </a:p>
+        </p:txBody>
+      </p:sp>
+      <p:sp>
+        <p:nvSpPr>
+          <p:cNvPr id="4" name="Espace réservé du numéro de diapositive 3"/>
+          <p:cNvSpPr>
+            <a:spLocks noGrp="1"/>
+          </p:cNvSpPr>
+          <p:nvPr>
+            <p:ph type="sldNum" sz="quarter" idx="5"/>
+          </p:nvPr>
+        </p:nvSpPr>
+        <p:spPr/>
+        <p:txBody>
+          <a:bodyPr/>
+          <a:lstStyle/>
+          <a:p>
+            <a:fld id="{934F9F8C-C2F0-47BE-869B-A56261F7714D}" type="slidenum">
+              <a:rPr lang="fr-FR" smtClean="0"/>
+              <a:t>25</a:t>
+            </a:fld>
+            <a:endParaRPr lang="fr-FR"/>
+          </a:p>
+        </p:txBody>
+      </p:sp>
+    </p:spTree>
+    <p:extLst>
+      <p:ext uri="{BB962C8B-B14F-4D97-AF65-F5344CB8AC3E}">
+        <p14:creationId xmlns:p14="http://schemas.microsoft.com/office/powerpoint/2010/main" val="1359905688"/>
+      </p:ext>
+    </p:extLst>
+  </p:cSld>
+  <p:clrMapOvr>
+    <a:masterClrMapping/>
+  </p:clrMapOvr>
+</p:notes>
+</file>
+
 <file path=ppt/notesSlides/notesSlide3.xml><?xml version="1.0" encoding="utf-8"?>
 <p:notes xmlns:a="http://schemas.openxmlformats.org/drawingml/2006/main" xmlns:r="http://schemas.openxmlformats.org/officeDocument/2006/relationships" xmlns:p="http://schemas.openxmlformats.org/presentationml/2006/main">
   <p:cSld>
@@ -2788,7 +2877,7 @@
           <a:p>
             <a:fld id="{B766274C-2624-4B13-811C-EFB085CCF3EF}" type="datetime1">
               <a:rPr lang="en-US" smtClean="0"/>
-              <a:t>1/31/2026</a:t>
+              <a:t>2/1/2026</a:t>
             </a:fld>
             <a:endParaRPr lang="en-US"/>
           </a:p>
@@ -2956,7 +3045,7 @@
           <a:p>
             <a:fld id="{2FFD21BD-A266-4643-8A00-A07ACDC90931}" type="datetime1">
               <a:rPr lang="en-US" smtClean="0"/>
-              <a:t>1/31/2026</a:t>
+              <a:t>2/1/2026</a:t>
             </a:fld>
             <a:endParaRPr lang="en-US"/>
           </a:p>
@@ -3134,7 +3223,7 @@
           <a:p>
             <a:fld id="{19CB6238-3A0E-4865-AC95-269FDB4AE8BC}" type="datetime1">
               <a:rPr lang="en-US" smtClean="0"/>
-              <a:t>1/31/2026</a:t>
+              <a:t>2/1/2026</a:t>
             </a:fld>
             <a:endParaRPr lang="en-US"/>
           </a:p>
@@ -3302,7 +3391,7 @@
           <a:p>
             <a:fld id="{73861260-BAD4-4847-8E7D-0379CF53B020}" type="datetime1">
               <a:rPr lang="en-US" smtClean="0"/>
-              <a:t>1/31/2026</a:t>
+              <a:t>2/1/2026</a:t>
             </a:fld>
             <a:endParaRPr lang="en-US"/>
           </a:p>
@@ -3547,7 +3636,7 @@
           <a:p>
             <a:fld id="{4221C9F4-2B18-46D4-8F3B-E77EFFCAD3EA}" type="datetime1">
               <a:rPr lang="en-US" smtClean="0"/>
-              <a:t>1/31/2026</a:t>
+              <a:t>2/1/2026</a:t>
             </a:fld>
             <a:endParaRPr lang="en-US"/>
           </a:p>
@@ -3832,7 +3921,7 @@
           <a:p>
             <a:fld id="{79E15A3C-9776-463D-A332-A8A70B8D76BF}" type="datetime1">
               <a:rPr lang="en-US" smtClean="0"/>
-              <a:t>1/31/2026</a:t>
+              <a:t>2/1/2026</a:t>
             </a:fld>
             <a:endParaRPr lang="en-US"/>
           </a:p>
@@ -4251,7 +4340,7 @@
           <a:p>
             <a:fld id="{5E723EC8-06A0-4213-9614-0D62C459D808}" type="datetime1">
               <a:rPr lang="en-US" smtClean="0"/>
-              <a:t>1/31/2026</a:t>
+              <a:t>2/1/2026</a:t>
             </a:fld>
             <a:endParaRPr lang="en-US"/>
           </a:p>
@@ -4368,7 +4457,7 @@
           <a:p>
             <a:fld id="{23A55F93-0982-48EE-AD53-201E7E1563F7}" type="datetime1">
               <a:rPr lang="en-US" smtClean="0"/>
-              <a:t>1/31/2026</a:t>
+              <a:t>2/1/2026</a:t>
             </a:fld>
             <a:endParaRPr lang="en-US"/>
           </a:p>
@@ -4463,7 +4552,7 @@
           <a:p>
             <a:fld id="{D34DDA1F-E858-4086-9D09-77E99A3BDA63}" type="datetime1">
               <a:rPr lang="en-US" smtClean="0"/>
-              <a:t>1/31/2026</a:t>
+              <a:t>2/1/2026</a:t>
             </a:fld>
             <a:endParaRPr lang="en-US"/>
           </a:p>
@@ -4738,7 +4827,7 @@
           <a:p>
             <a:fld id="{2550094A-DB6B-491B-AE74-BF72E06B4F8F}" type="datetime1">
               <a:rPr lang="en-US" smtClean="0"/>
-              <a:t>1/31/2026</a:t>
+              <a:t>2/1/2026</a:t>
             </a:fld>
             <a:endParaRPr lang="en-US"/>
           </a:p>
@@ -4990,7 +5079,7 @@
           <a:p>
             <a:fld id="{C73CCE1A-1371-4799-8192-7F4692E49A7A}" type="datetime1">
               <a:rPr lang="en-US" smtClean="0"/>
-              <a:t>1/31/2026</a:t>
+              <a:t>2/1/2026</a:t>
             </a:fld>
             <a:endParaRPr lang="en-US"/>
           </a:p>
@@ -5201,7 +5290,7 @@
           <a:p>
             <a:fld id="{02882518-A012-45B3-9A1F-D1E283A43FAF}" type="datetime1">
               <a:rPr lang="en-US" smtClean="0"/>
-              <a:t>1/31/2026</a:t>
+              <a:t>2/1/2026</a:t>
             </a:fld>
             <a:endParaRPr lang="en-US"/>
           </a:p>
@@ -6328,7 +6417,7 @@
               </a:spcAft>
             </a:pPr>
             <a:r>
-              <a:rPr sz="1200" b="1">
+              <a:rPr sz="1200" b="1" dirty="0">
                 <a:solidFill>
                   <a:srgbClr val="616161"/>
                 </a:solidFill>
@@ -6760,7 +6849,7 @@
         </p:nvSpPr>
         <p:spPr>
           <a:xfrm>
-            <a:off x="9501905" y="6462976"/>
+            <a:off x="9501905" y="6150840"/>
             <a:ext cx="2690095" cy="290336"/>
           </a:xfrm>
           <a:prstGeom prst="rect">
@@ -15102,7 +15191,7 @@
               </a:spcAft>
             </a:pPr>
             <a:r>
-              <a:rPr sz="2392" b="1">
+              <a:rPr sz="2392" b="1" dirty="0">
                 <a:solidFill>
                   <a:srgbClr val="212121"/>
                 </a:solidFill>
@@ -15111,18 +15200,27 @@
               <a:t>Random Forest</a:t>
             </a:r>
             <a:r>
-              <a:rPr sz="1104"/>
+              <a:rPr sz="1104" dirty="0"/>
               <a:t>
 </a:t>
             </a:r>
             <a:r>
-              <a:rPr sz="2392" b="1">
+              <a:rPr sz="2392" b="1" dirty="0" err="1">
                 <a:solidFill>
                   <a:srgbClr val="212121"/>
                 </a:solidFill>
                 <a:latin typeface="Montserrat"/>
               </a:rPr>
-              <a:t>Calcul de DJU</a:t>
+              <a:t>Calcul</a:t>
+            </a:r>
+            <a:r>
+              <a:rPr sz="2392" b="1" dirty="0">
+                <a:solidFill>
+                  <a:srgbClr val="212121"/>
+                </a:solidFill>
+                <a:latin typeface="Montserrat"/>
+              </a:rPr>
+              <a:t> de DJU</a:t>
             </a:r>
           </a:p>
         </p:txBody>
@@ -23088,8 +23186,8 @@
         </p:nvSpPr>
         <p:spPr>
           <a:xfrm>
-            <a:off x="3162220" y="5924549"/>
-            <a:ext cx="1676358" cy="323849"/>
+            <a:off x="3162220" y="5907515"/>
+            <a:ext cx="1676358" cy="357918"/>
           </a:xfrm>
           <a:prstGeom prst="rect">
             <a:avLst/>
@@ -23114,13 +23212,67 @@
               </a:spcAft>
             </a:pPr>
             <a:r>
-              <a:rPr sz="717" b="0">
+              <a:rPr sz="717" b="0" dirty="0">
                 <a:solidFill>
                   <a:srgbClr val="757575"/>
                 </a:solidFill>
                 <a:latin typeface="Montserrat"/>
               </a:rPr>
-              <a:t>Split 90%/10% ordonné dans le temps</a:t>
+              <a:t>Split </a:t>
+            </a:r>
+            <a:r>
+              <a:rPr lang="fr-FR" sz="717" dirty="0">
+                <a:solidFill>
+                  <a:srgbClr val="757575"/>
+                </a:solidFill>
+                <a:latin typeface="Montserrat"/>
+              </a:rPr>
+              <a:t>75</a:t>
+            </a:r>
+            <a:r>
+              <a:rPr sz="717" b="0" dirty="0">
+                <a:solidFill>
+                  <a:srgbClr val="757575"/>
+                </a:solidFill>
+                <a:latin typeface="Montserrat"/>
+              </a:rPr>
+              <a:t>%/</a:t>
+            </a:r>
+            <a:r>
+              <a:rPr lang="fr-FR" sz="717" b="0" dirty="0">
+                <a:solidFill>
+                  <a:srgbClr val="757575"/>
+                </a:solidFill>
+                <a:latin typeface="Montserrat"/>
+              </a:rPr>
+              <a:t>25</a:t>
+            </a:r>
+            <a:r>
+              <a:rPr sz="717" b="0" dirty="0">
+                <a:solidFill>
+                  <a:srgbClr val="757575"/>
+                </a:solidFill>
+                <a:latin typeface="Montserrat"/>
+              </a:rPr>
+              <a:t>% </a:t>
+            </a:r>
+            <a:r>
+              <a:rPr sz="717" b="0" dirty="0" err="1">
+                <a:solidFill>
+                  <a:srgbClr val="757575"/>
+                </a:solidFill>
+                <a:latin typeface="Montserrat"/>
+              </a:rPr>
+              <a:t>ordonné</a:t>
+            </a:r>
+            <a:r>
+              <a:rPr sz="717" b="0" dirty="0">
+                <a:solidFill>
+                  <a:srgbClr val="757575"/>
+                </a:solidFill>
+                <a:latin typeface="Montserrat"/>
+              </a:rPr>
+              <a:t> dans le temps</a:t>
             </a:r>
           </a:p>
         </p:txBody>
@@ -25025,7 +25177,7 @@
         </p:blipFill>
         <p:spPr>
           <a:xfrm>
-            <a:off x="5962500" y="1962149"/>
+            <a:off x="6096000" y="2973902"/>
             <a:ext cx="142871" cy="142875"/>
           </a:xfrm>
           <a:prstGeom prst="rect">
@@ -25041,7 +25193,7 @@
         </p:nvSpPr>
         <p:spPr>
           <a:xfrm>
-            <a:off x="6200619" y="1924049"/>
+            <a:off x="6334119" y="2935802"/>
             <a:ext cx="1543011" cy="219074"/>
           </a:xfrm>
           <a:prstGeom prst="rect">
@@ -25086,7 +25238,7 @@
         </p:nvSpPr>
         <p:spPr>
           <a:xfrm>
-            <a:off x="5962500" y="2381250"/>
+            <a:off x="6096000" y="3393003"/>
             <a:ext cx="1695407" cy="1190625"/>
           </a:xfrm>
           <a:prstGeom prst="roundRect">
@@ -25134,7 +25286,7 @@
         </p:nvSpPr>
         <p:spPr>
           <a:xfrm>
-            <a:off x="6724481" y="2667000"/>
+            <a:off x="6857981" y="3678753"/>
             <a:ext cx="161920" cy="190499"/>
           </a:xfrm>
           <a:prstGeom prst="rect">
@@ -25179,7 +25331,7 @@
         </p:nvSpPr>
         <p:spPr>
           <a:xfrm>
-            <a:off x="6276818" y="2962274"/>
+            <a:off x="6410318" y="3974027"/>
             <a:ext cx="1057248" cy="361950"/>
           </a:xfrm>
           <a:prstGeom prst="rect">
@@ -25224,7 +25376,7 @@
         </p:nvSpPr>
         <p:spPr>
           <a:xfrm>
-            <a:off x="7848403" y="2381250"/>
+            <a:off x="7981903" y="3393003"/>
             <a:ext cx="1704932" cy="1190625"/>
           </a:xfrm>
           <a:prstGeom prst="roundRect">
@@ -25272,7 +25424,7 @@
         </p:nvSpPr>
         <p:spPr>
           <a:xfrm>
-            <a:off x="8486562" y="2667000"/>
+            <a:off x="8620062" y="3678753"/>
             <a:ext cx="409564" cy="190499"/>
           </a:xfrm>
           <a:prstGeom prst="rect">
@@ -25317,7 +25469,7 @@
         </p:nvSpPr>
         <p:spPr>
           <a:xfrm>
-            <a:off x="8086522" y="2962274"/>
+            <a:off x="8220022" y="3974027"/>
             <a:ext cx="1228694" cy="361950"/>
           </a:xfrm>
           <a:prstGeom prst="rect">
@@ -25371,7 +25523,7 @@
         </p:nvSpPr>
         <p:spPr>
           <a:xfrm>
-            <a:off x="9734306" y="2381250"/>
+            <a:off x="9867806" y="3393003"/>
             <a:ext cx="1695407" cy="1190625"/>
           </a:xfrm>
           <a:prstGeom prst="roundRect">
@@ -25419,7 +25571,7 @@
         </p:nvSpPr>
         <p:spPr>
           <a:xfrm>
-            <a:off x="10420089" y="2667000"/>
+            <a:off x="10553589" y="3678753"/>
             <a:ext cx="323841" cy="190499"/>
           </a:xfrm>
           <a:prstGeom prst="rect">
@@ -25464,7 +25616,7 @@
         </p:nvSpPr>
         <p:spPr>
           <a:xfrm>
-            <a:off x="9981950" y="2962274"/>
+            <a:off x="10115450" y="3974027"/>
             <a:ext cx="1209644" cy="361950"/>
           </a:xfrm>
           <a:prstGeom prst="rect">
@@ -25506,223 +25658,6 @@
                 <a:latin typeface="Montserrat"/>
               </a:rPr>
               <a:t>kWh</a:t>
-            </a:r>
-          </a:p>
-        </p:txBody>
-      </p:sp>
-      <p:sp>
-        <p:nvSpPr>
-          <p:cNvPr id="42" name="Rounded Rectangle 41"/>
-          <p:cNvSpPr/>
-          <p:nvPr/>
-        </p:nvSpPr>
-        <p:spPr>
-          <a:xfrm>
-            <a:off x="5962500" y="3848099"/>
-            <a:ext cx="5467213" cy="1085850"/>
-          </a:xfrm>
-          <a:prstGeom prst="roundRect">
-            <a:avLst>
-              <a:gd name="adj" fmla="val 21052"/>
-            </a:avLst>
-          </a:prstGeom>
-          <a:gradFill rotWithShape="1">
-            <a:gsLst>
-              <a:gs pos="0">
-                <a:srgbClr val="FFF3E0"/>
-              </a:gs>
-              <a:gs pos="100000">
-                <a:srgbClr val="FFE0B2"/>
-              </a:gs>
-            </a:gsLst>
-            <a:lin ang="8100000" scaled="0"/>
-          </a:gradFill>
-          <a:ln>
-            <a:noFill/>
-          </a:ln>
-        </p:spPr>
-        <p:style>
-          <a:lnRef idx="1">
-            <a:schemeClr val="accent1"/>
-          </a:lnRef>
-          <a:fillRef idx="3">
-            <a:schemeClr val="accent1"/>
-          </a:fillRef>
-          <a:effectRef idx="2">
-            <a:schemeClr val="accent1"/>
-          </a:effectRef>
-          <a:fontRef idx="minor">
-            <a:schemeClr val="lt1"/>
-          </a:fontRef>
-        </p:style>
-        <p:txBody>
-          <a:bodyPr rtlCol="0" anchor="ctr"/>
-          <a:lstStyle/>
-          <a:p>
-            <a:pPr algn="ctr"/>
-            <a:endParaRPr/>
-          </a:p>
-        </p:txBody>
-      </p:sp>
-      <p:sp>
-        <p:nvSpPr>
-          <p:cNvPr id="43" name="Round Same Side Corner Rectangle 42"/>
-          <p:cNvSpPr/>
-          <p:nvPr/>
-        </p:nvSpPr>
-        <p:spPr>
-          <a:xfrm rot="16200000">
-            <a:off x="5502125" y="4308474"/>
-            <a:ext cx="1085850" cy="165100"/>
-          </a:xfrm>
-          <a:prstGeom prst="round2SameRect">
-            <a:avLst>
-              <a:gd name="adj1" fmla="val 50000"/>
-              <a:gd name="adj2" fmla="val 0"/>
-            </a:avLst>
-          </a:prstGeom>
-          <a:solidFill>
-            <a:srgbClr val="FF9800"/>
-          </a:solidFill>
-          <a:ln>
-            <a:noFill/>
-          </a:ln>
-        </p:spPr>
-        <p:style>
-          <a:lnRef idx="1">
-            <a:schemeClr val="accent1"/>
-          </a:lnRef>
-          <a:fillRef idx="3">
-            <a:schemeClr val="accent1"/>
-          </a:fillRef>
-          <a:effectRef idx="2">
-            <a:schemeClr val="accent1"/>
-          </a:effectRef>
-          <a:fontRef idx="minor">
-            <a:schemeClr val="lt1"/>
-          </a:fontRef>
-        </p:style>
-        <p:txBody>
-          <a:bodyPr rtlCol="0" anchor="ctr"/>
-          <a:lstStyle/>
-          <a:p>
-            <a:pPr algn="ctr"/>
-            <a:endParaRPr/>
-          </a:p>
-        </p:txBody>
-      </p:sp>
-      <p:pic>
-        <p:nvPicPr>
-          <p:cNvPr id="44" name="Picture 43" descr="image.png"/>
-          <p:cNvPicPr>
-            <a:picLocks noChangeAspect="1"/>
-          </p:cNvPicPr>
-          <p:nvPr/>
-        </p:nvPicPr>
-        <p:blipFill>
-          <a:blip r:embed="rId7">
-            <a:alphaModFix/>
-          </a:blip>
-          <a:stretch>
-            <a:fillRect/>
-          </a:stretch>
-        </p:blipFill>
-        <p:spPr>
-          <a:xfrm>
-            <a:off x="6219669" y="4095749"/>
-            <a:ext cx="133346" cy="133349"/>
-          </a:xfrm>
-          <a:prstGeom prst="rect">
-            <a:avLst/>
-          </a:prstGeom>
-        </p:spPr>
-      </p:pic>
-      <p:sp>
-        <p:nvSpPr>
-          <p:cNvPr id="45" name="TextBox 44"/>
-          <p:cNvSpPr txBox="1"/>
-          <p:nvPr/>
-        </p:nvSpPr>
-        <p:spPr>
-          <a:xfrm>
-            <a:off x="6448263" y="4057650"/>
-            <a:ext cx="1504912" cy="200025"/>
-          </a:xfrm>
-          <a:prstGeom prst="rect">
-            <a:avLst/>
-          </a:prstGeom>
-          <a:noFill/>
-        </p:spPr>
-        <p:txBody>
-          <a:bodyPr wrap="none" lIns="73152" tIns="54864" rIns="73152" bIns="54864" anchor="ctr">
-            <a:spAutoFit/>
-          </a:bodyPr>
-          <a:lstStyle/>
-          <a:p>
-            <a:pPr algn="l">
-              <a:lnSpc>
-                <a:spcPts val="1365"/>
-              </a:lnSpc>
-              <a:spcBef>
-                <a:spcPts val="0"/>
-              </a:spcBef>
-              <a:spcAft>
-                <a:spcPts val="0"/>
-              </a:spcAft>
-            </a:pPr>
-            <a:r>
-              <a:rPr sz="837" b="1">
-                <a:solidFill>
-                  <a:srgbClr val="F57C00"/>
-                </a:solidFill>
-                <a:latin typeface="Montserrat"/>
-              </a:rPr>
-              <a:t>Limitation du modèle</a:t>
-            </a:r>
-          </a:p>
-        </p:txBody>
-      </p:sp>
-      <p:sp>
-        <p:nvSpPr>
-          <p:cNvPr id="46" name="TextBox 45"/>
-          <p:cNvSpPr txBox="1"/>
-          <p:nvPr/>
-        </p:nvSpPr>
-        <p:spPr>
-          <a:xfrm>
-            <a:off x="6219669" y="4352924"/>
-            <a:ext cx="5000499" cy="371475"/>
-          </a:xfrm>
-          <a:prstGeom prst="rect">
-            <a:avLst/>
-          </a:prstGeom>
-          <a:noFill/>
-        </p:spPr>
-        <p:txBody>
-          <a:bodyPr wrap="square" lIns="73152" tIns="54864" rIns="73152" bIns="54864" anchor="ctr">
-            <a:spAutoFit/>
-          </a:bodyPr>
-          <a:lstStyle/>
-          <a:p>
-            <a:pPr algn="l">
-              <a:lnSpc>
-                <a:spcPts val="1235"/>
-              </a:lnSpc>
-              <a:spcBef>
-                <a:spcPts val="0"/>
-              </a:spcBef>
-              <a:spcAft>
-                <a:spcPts val="0"/>
-              </a:spcAft>
-            </a:pPr>
-            <a:r>
-              <a:rPr sz="777" b="0">
-                <a:solidFill>
-                  <a:srgbClr val="616161"/>
-                </a:solidFill>
-                <a:latin typeface="Montserrat"/>
-              </a:rPr>
-              <a:t>Sous-performance pour relations non-linéaires (température-consumption en forme U). Les modèles d'ensemble sont mieux adaptés.</a:t>
             </a:r>
           </a:p>
         </p:txBody>
@@ -27206,7 +27141,7 @@
         </p:blipFill>
         <p:spPr>
           <a:xfrm>
-            <a:off x="8417771" y="3045100"/>
+            <a:off x="8382096" y="3045100"/>
             <a:ext cx="3809904" cy="3809999"/>
           </a:xfrm>
           <a:prstGeom prst="rect">
@@ -28296,7 +28231,7 @@
         </p:nvSpPr>
         <p:spPr>
           <a:xfrm>
-            <a:off x="8220184" y="3362150"/>
+            <a:off x="8229293" y="4025486"/>
             <a:ext cx="687945" cy="375680"/>
           </a:xfrm>
           <a:prstGeom prst="rect">
@@ -28341,7 +28276,7 @@
         </p:nvSpPr>
         <p:spPr>
           <a:xfrm>
-            <a:off x="9100810" y="3228833"/>
+            <a:off x="9109919" y="3892169"/>
             <a:ext cx="1271438" cy="296107"/>
           </a:xfrm>
           <a:prstGeom prst="rect">
@@ -28392,7 +28327,7 @@
         </p:nvSpPr>
         <p:spPr>
           <a:xfrm>
-            <a:off x="9100810" y="3473143"/>
+            <a:off x="9109919" y="4136479"/>
             <a:ext cx="1535933" cy="264688"/>
           </a:xfrm>
           <a:prstGeom prst="rect">
@@ -28426,102 +28361,6 @@
               </a:rPr>
               <a:t>Résultats et erreurs</a:t>
             </a:r>
-          </a:p>
-        </p:txBody>
-      </p:sp>
-      <p:sp>
-        <p:nvSpPr>
-          <p:cNvPr id="37" name="TextBox 36"/>
-          <p:cNvSpPr txBox="1"/>
-          <p:nvPr/>
-        </p:nvSpPr>
-        <p:spPr>
-          <a:xfrm>
-            <a:off x="8288061" y="4098235"/>
-            <a:ext cx="586956" cy="375680"/>
-          </a:xfrm>
-          <a:prstGeom prst="rect">
-            <a:avLst/>
-          </a:prstGeom>
-          <a:noFill/>
-        </p:spPr>
-        <p:txBody>
-          <a:bodyPr wrap="none" lIns="73152" tIns="54864" rIns="73152" bIns="54864" anchor="ctr">
-            <a:spAutoFit/>
-          </a:bodyPr>
-          <a:lstStyle/>
-          <a:p>
-            <a:pPr algn="l">
-              <a:lnSpc>
-                <a:spcPts val="1690"/>
-              </a:lnSpc>
-              <a:spcBef>
-                <a:spcPts val="0"/>
-              </a:spcBef>
-              <a:spcAft>
-                <a:spcPts val="0"/>
-              </a:spcAft>
-            </a:pPr>
-            <a:r>
-              <a:rPr sz="3200" b="1" dirty="0">
-                <a:solidFill>
-                  <a:srgbClr val="AB47BC"/>
-                </a:solidFill>
-                <a:latin typeface="Montserrat"/>
-              </a:rPr>
-              <a:t>10</a:t>
-            </a:r>
-          </a:p>
-        </p:txBody>
-      </p:sp>
-      <p:sp>
-        <p:nvSpPr>
-          <p:cNvPr id="38" name="TextBox 37"/>
-          <p:cNvSpPr txBox="1"/>
-          <p:nvPr/>
-        </p:nvSpPr>
-        <p:spPr>
-          <a:xfrm>
-            <a:off x="9100810" y="3981309"/>
-            <a:ext cx="939616" cy="296107"/>
-          </a:xfrm>
-          <a:prstGeom prst="rect">
-            <a:avLst/>
-          </a:prstGeom>
-          <a:noFill/>
-        </p:spPr>
-        <p:txBody>
-          <a:bodyPr wrap="none" lIns="73152" tIns="54864" rIns="73152" bIns="54864" anchor="ctr">
-            <a:spAutoFit/>
-          </a:bodyPr>
-          <a:lstStyle/>
-          <a:p>
-            <a:pPr algn="l">
-              <a:lnSpc>
-                <a:spcPts val="1365"/>
-              </a:lnSpc>
-              <a:spcBef>
-                <a:spcPts val="0"/>
-              </a:spcBef>
-              <a:spcAft>
-                <a:spcPts val="260"/>
-              </a:spcAft>
-            </a:pPr>
-            <a:r>
-              <a:rPr lang="fr-FR" sz="1600" b="1" dirty="0">
-                <a:solidFill>
-                  <a:srgbClr val="424242"/>
-                </a:solidFill>
-                <a:latin typeface="Montserrat"/>
-              </a:rPr>
-              <a:t>Limites</a:t>
-            </a:r>
-            <a:endParaRPr sz="1600" b="1" dirty="0">
-              <a:solidFill>
-                <a:srgbClr val="424242"/>
-              </a:solidFill>
-              <a:latin typeface="Montserrat"/>
-            </a:endParaRPr>
           </a:p>
         </p:txBody>
       </p:sp>
@@ -28988,7 +28827,7 @@
               </a:spcAft>
             </a:pPr>
             <a:r>
-              <a:rPr sz="1050" b="0">
+              <a:rPr sz="1050" b="0" dirty="0" err="1">
                 <a:solidFill>
                   <a:srgbClr val="9E9E9E"/>
                 </a:solidFill>
@@ -28996,6 +28835,120 @@
               </a:rPr>
               <a:t>Recommandations</a:t>
             </a:r>
+            <a:endParaRPr sz="1050" b="0" dirty="0">
+              <a:solidFill>
+                <a:srgbClr val="9E9E9E"/>
+              </a:solidFill>
+              <a:latin typeface="Montserrat"/>
+            </a:endParaRPr>
+          </a:p>
+        </p:txBody>
+      </p:sp>
+      <p:sp>
+        <p:nvSpPr>
+          <p:cNvPr id="46" name="TextBox 36">
+            <a:extLst>
+              <a:ext uri="{FF2B5EF4-FFF2-40B4-BE49-F238E27FC236}">
+                <a16:creationId xmlns:a16="http://schemas.microsoft.com/office/drawing/2014/main" id="{89326ACE-E94B-BAB4-FCB3-D5D760748363}"/>
+              </a:ext>
+            </a:extLst>
+          </p:cNvPr>
+          <p:cNvSpPr txBox="1"/>
+          <p:nvPr/>
+        </p:nvSpPr>
+        <p:spPr>
+          <a:xfrm>
+            <a:off x="8250033" y="3221489"/>
+            <a:ext cx="586956" cy="375680"/>
+          </a:xfrm>
+          <a:prstGeom prst="rect">
+            <a:avLst/>
+          </a:prstGeom>
+          <a:noFill/>
+        </p:spPr>
+        <p:txBody>
+          <a:bodyPr wrap="none" lIns="73152" tIns="54864" rIns="73152" bIns="54864" anchor="ctr">
+            <a:spAutoFit/>
+          </a:bodyPr>
+          <a:lstStyle/>
+          <a:p>
+            <a:pPr algn="l">
+              <a:lnSpc>
+                <a:spcPts val="1690"/>
+              </a:lnSpc>
+              <a:spcBef>
+                <a:spcPts val="0"/>
+              </a:spcBef>
+              <a:spcAft>
+                <a:spcPts val="0"/>
+              </a:spcAft>
+            </a:pPr>
+            <a:r>
+              <a:rPr sz="3200" b="1" dirty="0">
+                <a:solidFill>
+                  <a:srgbClr val="AB47BC"/>
+                </a:solidFill>
+                <a:latin typeface="Montserrat"/>
+              </a:rPr>
+              <a:t>10</a:t>
+            </a:r>
+          </a:p>
+        </p:txBody>
+      </p:sp>
+      <p:sp>
+        <p:nvSpPr>
+          <p:cNvPr id="49" name="TextBox 37">
+            <a:extLst>
+              <a:ext uri="{FF2B5EF4-FFF2-40B4-BE49-F238E27FC236}">
+                <a16:creationId xmlns:a16="http://schemas.microsoft.com/office/drawing/2014/main" id="{955DE5F3-BFF2-A1F9-12DB-878597CE6675}"/>
+              </a:ext>
+            </a:extLst>
+          </p:cNvPr>
+          <p:cNvSpPr txBox="1"/>
+          <p:nvPr/>
+        </p:nvSpPr>
+        <p:spPr>
+          <a:xfrm>
+            <a:off x="9079618" y="3178687"/>
+            <a:ext cx="939616" cy="296107"/>
+          </a:xfrm>
+          <a:prstGeom prst="rect">
+            <a:avLst/>
+          </a:prstGeom>
+          <a:noFill/>
+        </p:spPr>
+        <p:txBody>
+          <a:bodyPr wrap="none" lIns="73152" tIns="54864" rIns="73152" bIns="54864" anchor="ctr">
+            <a:spAutoFit/>
+          </a:bodyPr>
+          <a:lstStyle/>
+          <a:p>
+            <a:pPr algn="l">
+              <a:lnSpc>
+                <a:spcPts val="1365"/>
+              </a:lnSpc>
+              <a:spcBef>
+                <a:spcPts val="0"/>
+              </a:spcBef>
+              <a:spcAft>
+                <a:spcPts val="260"/>
+              </a:spcAft>
+            </a:pPr>
+            <a:r>
+              <a:rPr lang="fr-FR" sz="1600" b="1" dirty="0">
+                <a:solidFill>
+                  <a:srgbClr val="424242"/>
+                </a:solidFill>
+                <a:latin typeface="Montserrat"/>
+              </a:rPr>
+              <a:t>Limites</a:t>
+            </a:r>
+            <a:endParaRPr sz="1600" b="1" dirty="0">
+              <a:solidFill>
+                <a:srgbClr val="424242"/>
+              </a:solidFill>
+              <a:latin typeface="Montserrat"/>
+            </a:endParaRPr>
           </a:p>
         </p:txBody>
       </p:sp>
@@ -37954,6 +37907,1577 @@
         </p:txBody>
       </p:sp>
     </p:spTree>
+  </p:cSld>
+  <p:clrMapOvr>
+    <a:masterClrMapping/>
+  </p:clrMapOvr>
+</p:sld>
+</file>
+
+<file path=ppt/slides/slide25.xml><?xml version="1.0" encoding="utf-8"?>
+<p:sld xmlns:a="http://schemas.openxmlformats.org/drawingml/2006/main" xmlns:r="http://schemas.openxmlformats.org/officeDocument/2006/relationships" xmlns:p="http://schemas.openxmlformats.org/presentationml/2006/main">
+  <p:cSld>
+    <p:spTree>
+      <p:nvGrpSpPr>
+        <p:cNvPr id="1" name=""/>
+        <p:cNvGrpSpPr/>
+        <p:nvPr/>
+      </p:nvGrpSpPr>
+      <p:grpSpPr>
+        <a:xfrm>
+          <a:off x="0" y="0"/>
+          <a:ext cx="0" cy="0"/>
+          <a:chOff x="0" y="0"/>
+          <a:chExt cx="0" cy="0"/>
+        </a:xfrm>
+      </p:grpSpPr>
+      <p:sp>
+        <p:nvSpPr>
+          <p:cNvPr id="3" name="Rounded Rectangle 2"/>
+          <p:cNvSpPr/>
+          <p:nvPr/>
+        </p:nvSpPr>
+        <p:spPr>
+          <a:xfrm>
+            <a:off x="9858153" y="-1609724"/>
+            <a:ext cx="3809904" cy="3809999"/>
+          </a:xfrm>
+          <a:prstGeom prst="roundRect">
+            <a:avLst>
+              <a:gd name="adj" fmla="val 50000"/>
+            </a:avLst>
+          </a:prstGeom>
+          <a:solidFill>
+            <a:srgbClr val="E3F2FD">
+              <a:alpha val="60000"/>
+            </a:srgbClr>
+          </a:solidFill>
+          <a:ln>
+            <a:noFill/>
+          </a:ln>
+        </p:spPr>
+        <p:style>
+          <a:lnRef idx="1">
+            <a:schemeClr val="accent1"/>
+          </a:lnRef>
+          <a:fillRef idx="3">
+            <a:schemeClr val="accent1"/>
+          </a:fillRef>
+          <a:effectRef idx="2">
+            <a:schemeClr val="accent1"/>
+          </a:effectRef>
+          <a:fontRef idx="minor">
+            <a:schemeClr val="lt1"/>
+          </a:fontRef>
+        </p:style>
+        <p:txBody>
+          <a:bodyPr rtlCol="0" anchor="ctr"/>
+          <a:lstStyle/>
+          <a:p>
+            <a:pPr algn="ctr"/>
+            <a:endParaRPr/>
+          </a:p>
+        </p:txBody>
+      </p:sp>
+      <p:pic>
+        <p:nvPicPr>
+          <p:cNvPr id="5" name="Picture 4" descr="image.png"/>
+          <p:cNvPicPr>
+            <a:picLocks noChangeAspect="1"/>
+          </p:cNvPicPr>
+          <p:nvPr/>
+        </p:nvPicPr>
+        <p:blipFill>
+          <a:blip r:embed="rId3">
+            <a:alphaModFix/>
+          </a:blip>
+          <a:stretch>
+            <a:fillRect/>
+          </a:stretch>
+        </p:blipFill>
+        <p:spPr>
+          <a:xfrm>
+            <a:off x="8121047" y="2685161"/>
+            <a:ext cx="200019" cy="228600"/>
+          </a:xfrm>
+          <a:prstGeom prst="rect">
+            <a:avLst/>
+          </a:prstGeom>
+        </p:spPr>
+      </p:pic>
+      <p:sp>
+        <p:nvSpPr>
+          <p:cNvPr id="7" name="Rounded Rectangle 6"/>
+          <p:cNvSpPr/>
+          <p:nvPr/>
+        </p:nvSpPr>
+        <p:spPr>
+          <a:xfrm rot="5400000">
+            <a:off x="3208209" y="2890087"/>
+            <a:ext cx="76198" cy="2667000"/>
+          </a:xfrm>
+          <a:prstGeom prst="roundRect">
+            <a:avLst>
+              <a:gd name="adj" fmla="val 100000"/>
+            </a:avLst>
+          </a:prstGeom>
+          <a:solidFill>
+            <a:srgbClr val="42A5F5"/>
+          </a:solidFill>
+          <a:ln>
+            <a:noFill/>
+          </a:ln>
+        </p:spPr>
+        <p:style>
+          <a:lnRef idx="1">
+            <a:schemeClr val="accent1"/>
+          </a:lnRef>
+          <a:fillRef idx="3">
+            <a:schemeClr val="accent1"/>
+          </a:fillRef>
+          <a:effectRef idx="2">
+            <a:schemeClr val="accent1"/>
+          </a:effectRef>
+          <a:fontRef idx="minor">
+            <a:schemeClr val="lt1"/>
+          </a:fontRef>
+        </p:style>
+        <p:txBody>
+          <a:bodyPr rtlCol="0" anchor="ctr"/>
+          <a:lstStyle/>
+          <a:p>
+            <a:pPr algn="ctr"/>
+            <a:endParaRPr/>
+          </a:p>
+        </p:txBody>
+      </p:sp>
+      <p:sp>
+        <p:nvSpPr>
+          <p:cNvPr id="8" name="TextBox 7"/>
+          <p:cNvSpPr txBox="1"/>
+          <p:nvPr/>
+        </p:nvSpPr>
+        <p:spPr>
+          <a:xfrm>
+            <a:off x="1850604" y="1680446"/>
+            <a:ext cx="6251968" cy="2173480"/>
+          </a:xfrm>
+          <a:prstGeom prst="rect">
+            <a:avLst/>
+          </a:prstGeom>
+          <a:noFill/>
+        </p:spPr>
+        <p:txBody>
+          <a:bodyPr wrap="none" lIns="73152" tIns="54864" rIns="73152" bIns="54864" anchor="ctr">
+            <a:spAutoFit/>
+          </a:bodyPr>
+          <a:lstStyle/>
+          <a:p>
+            <a:pPr algn="l">
+              <a:spcBef>
+                <a:spcPts val="0"/>
+              </a:spcBef>
+              <a:spcAft>
+                <a:spcPts val="1820"/>
+              </a:spcAft>
+            </a:pPr>
+            <a:r>
+              <a:rPr sz="3468" b="1" dirty="0" err="1">
+                <a:solidFill>
+                  <a:srgbClr val="212121"/>
+                </a:solidFill>
+                <a:latin typeface="Montserrat"/>
+              </a:rPr>
+              <a:t>Prédiction</a:t>
+            </a:r>
+            <a:r>
+              <a:rPr sz="3468" b="1" dirty="0">
+                <a:solidFill>
+                  <a:srgbClr val="212121"/>
+                </a:solidFill>
+                <a:latin typeface="Montserrat"/>
+              </a:rPr>
+              <a:t> de la</a:t>
+            </a:r>
+            <a:r>
+              <a:rPr sz="1104" dirty="0"/>
+              <a:t>
+</a:t>
+            </a:r>
+            <a:r>
+              <a:rPr sz="3468" b="1" dirty="0" err="1">
+                <a:solidFill>
+                  <a:srgbClr val="42A5F5"/>
+                </a:solidFill>
+                <a:latin typeface="Montserrat"/>
+              </a:rPr>
+              <a:t>Consommation</a:t>
+            </a:r>
+            <a:r>
+              <a:rPr sz="3468" b="1" dirty="0">
+                <a:solidFill>
+                  <a:srgbClr val="42A5F5"/>
+                </a:solidFill>
+                <a:latin typeface="Montserrat"/>
+              </a:rPr>
+              <a:t> </a:t>
+            </a:r>
+            <a:r>
+              <a:rPr sz="3468" b="1" dirty="0" err="1">
+                <a:solidFill>
+                  <a:srgbClr val="42A5F5"/>
+                </a:solidFill>
+                <a:latin typeface="Montserrat"/>
+              </a:rPr>
+              <a:t>Électrique</a:t>
+            </a:r>
+            <a:r>
+              <a:rPr sz="1104" dirty="0"/>
+              <a:t>
+</a:t>
+            </a:r>
+            <a:r>
+              <a:rPr sz="3468" b="1" dirty="0" err="1">
+                <a:solidFill>
+                  <a:srgbClr val="212121"/>
+                </a:solidFill>
+                <a:latin typeface="Montserrat"/>
+              </a:rPr>
+              <a:t>Journalière</a:t>
+            </a:r>
+            <a:endParaRPr sz="3468" b="1" dirty="0">
+              <a:solidFill>
+                <a:srgbClr val="212121"/>
+              </a:solidFill>
+              <a:latin typeface="Montserrat"/>
+            </a:endParaRPr>
+          </a:p>
+        </p:txBody>
+      </p:sp>
+      <p:sp>
+        <p:nvSpPr>
+          <p:cNvPr id="9" name="TextBox 8"/>
+          <p:cNvSpPr txBox="1"/>
+          <p:nvPr/>
+        </p:nvSpPr>
+        <p:spPr>
+          <a:xfrm>
+            <a:off x="1850604" y="3769762"/>
+            <a:ext cx="8705632" cy="358175"/>
+          </a:xfrm>
+          <a:prstGeom prst="rect">
+            <a:avLst/>
+          </a:prstGeom>
+          <a:noFill/>
+        </p:spPr>
+        <p:txBody>
+          <a:bodyPr wrap="square" lIns="73152" tIns="54864" rIns="73152" bIns="54864" anchor="ctr">
+            <a:spAutoFit/>
+          </a:bodyPr>
+          <a:lstStyle/>
+          <a:p>
+            <a:pPr algn="l">
+              <a:lnSpc>
+                <a:spcPts val="2145"/>
+              </a:lnSpc>
+              <a:spcBef>
+                <a:spcPts val="0"/>
+              </a:spcBef>
+              <a:spcAft>
+                <a:spcPts val="2600"/>
+              </a:spcAft>
+            </a:pPr>
+            <a:r>
+              <a:rPr sz="1435" b="0" dirty="0" err="1">
+                <a:solidFill>
+                  <a:srgbClr val="757575"/>
+                </a:solidFill>
+                <a:latin typeface="Roboto Slab"/>
+              </a:rPr>
+              <a:t>Approche</a:t>
+            </a:r>
+            <a:r>
+              <a:rPr sz="1435" b="0" dirty="0">
+                <a:solidFill>
+                  <a:srgbClr val="757575"/>
+                </a:solidFill>
+                <a:latin typeface="Roboto Slab"/>
+              </a:rPr>
+              <a:t> par </a:t>
+            </a:r>
+            <a:r>
+              <a:rPr sz="1435" b="0" dirty="0" err="1">
+                <a:solidFill>
+                  <a:srgbClr val="757575"/>
+                </a:solidFill>
+                <a:latin typeface="Roboto Slab"/>
+              </a:rPr>
+              <a:t>régression</a:t>
+            </a:r>
+            <a:r>
+              <a:rPr sz="1435" b="0" dirty="0">
+                <a:solidFill>
+                  <a:srgbClr val="757575"/>
+                </a:solidFill>
+                <a:latin typeface="Roboto Slab"/>
+              </a:rPr>
+              <a:t> : Random Forest, Gradient Boosting, </a:t>
+            </a:r>
+            <a:r>
+              <a:rPr sz="1435" b="0" dirty="0" err="1">
+                <a:solidFill>
+                  <a:srgbClr val="757575"/>
+                </a:solidFill>
+                <a:latin typeface="Roboto Slab"/>
+              </a:rPr>
+              <a:t>Régression</a:t>
+            </a:r>
+            <a:r>
+              <a:rPr sz="1435" b="0" dirty="0">
+                <a:solidFill>
+                  <a:srgbClr val="757575"/>
+                </a:solidFill>
+                <a:latin typeface="Roboto Slab"/>
+              </a:rPr>
+              <a:t> </a:t>
+            </a:r>
+            <a:r>
+              <a:rPr sz="1435" b="0" dirty="0" err="1">
+                <a:solidFill>
+                  <a:srgbClr val="757575"/>
+                </a:solidFill>
+                <a:latin typeface="Roboto Slab"/>
+              </a:rPr>
+              <a:t>Linéaire</a:t>
+            </a:r>
+            <a:endParaRPr sz="1435" b="0" dirty="0">
+              <a:solidFill>
+                <a:srgbClr val="757575"/>
+              </a:solidFill>
+              <a:latin typeface="Roboto Slab"/>
+            </a:endParaRPr>
+          </a:p>
+        </p:txBody>
+      </p:sp>
+      <p:pic>
+        <p:nvPicPr>
+          <p:cNvPr id="10" name="Picture 9" descr="image.png"/>
+          <p:cNvPicPr>
+            <a:picLocks noChangeAspect="1"/>
+          </p:cNvPicPr>
+          <p:nvPr/>
+        </p:nvPicPr>
+        <p:blipFill>
+          <a:blip r:embed="rId4">
+            <a:alphaModFix/>
+            <a:duotone>
+              <a:prstClr val="black"/>
+              <a:srgbClr val="42A5F5">
+                <a:tint val="45000"/>
+                <a:satMod val="400000"/>
+              </a:srgbClr>
+            </a:duotone>
+          </a:blip>
+          <a:stretch>
+            <a:fillRect/>
+          </a:stretch>
+        </p:blipFill>
+        <p:spPr>
+          <a:xfrm>
+            <a:off x="601946" y="5479748"/>
+            <a:ext cx="123821" cy="142875"/>
+          </a:xfrm>
+          <a:prstGeom prst="rect">
+            <a:avLst/>
+          </a:prstGeom>
+        </p:spPr>
+      </p:pic>
+      <p:sp>
+        <p:nvSpPr>
+          <p:cNvPr id="11" name="TextBox 10"/>
+          <p:cNvSpPr txBox="1"/>
+          <p:nvPr/>
+        </p:nvSpPr>
+        <p:spPr>
+          <a:xfrm>
+            <a:off x="821016" y="5406018"/>
+            <a:ext cx="1143198" cy="290336"/>
+          </a:xfrm>
+          <a:prstGeom prst="rect">
+            <a:avLst/>
+          </a:prstGeom>
+          <a:noFill/>
+        </p:spPr>
+        <p:txBody>
+          <a:bodyPr wrap="none" lIns="73152" tIns="54864" rIns="73152" bIns="54864" anchor="ctr">
+            <a:spAutoFit/>
+          </a:bodyPr>
+          <a:lstStyle/>
+          <a:p>
+            <a:pPr algn="l">
+              <a:lnSpc>
+                <a:spcPts val="1430"/>
+              </a:lnSpc>
+              <a:spcBef>
+                <a:spcPts val="0"/>
+              </a:spcBef>
+              <a:spcAft>
+                <a:spcPts val="0"/>
+              </a:spcAft>
+            </a:pPr>
+            <a:r>
+              <a:rPr lang="fr-FR" sz="1200" b="1" dirty="0">
+                <a:solidFill>
+                  <a:srgbClr val="616161"/>
+                </a:solidFill>
+                <a:latin typeface="Montserrat"/>
+              </a:rPr>
+              <a:t>AZZA Imane</a:t>
+            </a:r>
+            <a:endParaRPr sz="1200" b="1" dirty="0">
+              <a:solidFill>
+                <a:srgbClr val="616161"/>
+              </a:solidFill>
+              <a:latin typeface="Montserrat"/>
+            </a:endParaRPr>
+          </a:p>
+        </p:txBody>
+      </p:sp>
+      <p:pic>
+        <p:nvPicPr>
+          <p:cNvPr id="13" name="Picture 12" descr="image.png"/>
+          <p:cNvPicPr>
+            <a:picLocks noChangeAspect="1"/>
+          </p:cNvPicPr>
+          <p:nvPr/>
+        </p:nvPicPr>
+        <p:blipFill>
+          <a:blip r:embed="rId5">
+            <a:alphaModFix/>
+            <a:duotone>
+              <a:prstClr val="black"/>
+              <a:srgbClr val="42A5F5">
+                <a:tint val="45000"/>
+                <a:satMod val="400000"/>
+              </a:srgbClr>
+            </a:duotone>
+          </a:blip>
+          <a:stretch>
+            <a:fillRect/>
+          </a:stretch>
+        </p:blipFill>
+        <p:spPr>
+          <a:xfrm>
+            <a:off x="3143642" y="5484106"/>
+            <a:ext cx="142871" cy="142875"/>
+          </a:xfrm>
+          <a:prstGeom prst="rect">
+            <a:avLst/>
+          </a:prstGeom>
+        </p:spPr>
+      </p:pic>
+      <p:sp>
+        <p:nvSpPr>
+          <p:cNvPr id="14" name="TextBox 13"/>
+          <p:cNvSpPr txBox="1"/>
+          <p:nvPr/>
+        </p:nvSpPr>
+        <p:spPr>
+          <a:xfrm>
+            <a:off x="3381761" y="5410376"/>
+            <a:ext cx="1816459" cy="290336"/>
+          </a:xfrm>
+          <a:prstGeom prst="rect">
+            <a:avLst/>
+          </a:prstGeom>
+          <a:noFill/>
+        </p:spPr>
+        <p:txBody>
+          <a:bodyPr wrap="none" lIns="73152" tIns="54864" rIns="73152" bIns="54864" anchor="ctr">
+            <a:spAutoFit/>
+          </a:bodyPr>
+          <a:lstStyle/>
+          <a:p>
+            <a:pPr algn="l">
+              <a:lnSpc>
+                <a:spcPts val="1430"/>
+              </a:lnSpc>
+              <a:spcBef>
+                <a:spcPts val="0"/>
+              </a:spcBef>
+              <a:spcAft>
+                <a:spcPts val="0"/>
+              </a:spcAft>
+            </a:pPr>
+            <a:r>
+              <a:rPr sz="1200" b="1" dirty="0">
+                <a:solidFill>
+                  <a:srgbClr val="616161"/>
+                </a:solidFill>
+                <a:latin typeface="Montserrat"/>
+              </a:rPr>
+              <a:t>Master 1 ISI - SUPMTI</a:t>
+            </a:r>
+          </a:p>
+        </p:txBody>
+      </p:sp>
+      <p:pic>
+        <p:nvPicPr>
+          <p:cNvPr id="16" name="Picture 15" descr="image.png"/>
+          <p:cNvPicPr>
+            <a:picLocks noChangeAspect="1"/>
+          </p:cNvPicPr>
+          <p:nvPr/>
+        </p:nvPicPr>
+        <p:blipFill>
+          <a:blip r:embed="rId6">
+            <a:alphaModFix/>
+            <a:duotone>
+              <a:prstClr val="black"/>
+              <a:srgbClr val="42A5F5">
+                <a:tint val="45000"/>
+                <a:satMod val="400000"/>
+              </a:srgbClr>
+            </a:duotone>
+          </a:blip>
+          <a:stretch>
+            <a:fillRect/>
+          </a:stretch>
+        </p:blipFill>
+        <p:spPr>
+          <a:xfrm>
+            <a:off x="5530742" y="5494266"/>
+            <a:ext cx="104772" cy="142875"/>
+          </a:xfrm>
+          <a:prstGeom prst="rect">
+            <a:avLst/>
+          </a:prstGeom>
+        </p:spPr>
+      </p:pic>
+      <p:sp>
+        <p:nvSpPr>
+          <p:cNvPr id="17" name="TextBox 16"/>
+          <p:cNvSpPr txBox="1"/>
+          <p:nvPr/>
+        </p:nvSpPr>
+        <p:spPr>
+          <a:xfrm>
+            <a:off x="5730762" y="5420536"/>
+            <a:ext cx="1200906" cy="290336"/>
+          </a:xfrm>
+          <a:prstGeom prst="rect">
+            <a:avLst/>
+          </a:prstGeom>
+          <a:noFill/>
+        </p:spPr>
+        <p:txBody>
+          <a:bodyPr wrap="none" lIns="73152" tIns="54864" rIns="73152" bIns="54864" anchor="ctr">
+            <a:spAutoFit/>
+          </a:bodyPr>
+          <a:lstStyle/>
+          <a:p>
+            <a:pPr algn="l">
+              <a:lnSpc>
+                <a:spcPts val="1430"/>
+              </a:lnSpc>
+              <a:spcBef>
+                <a:spcPts val="0"/>
+              </a:spcBef>
+              <a:spcAft>
+                <a:spcPts val="0"/>
+              </a:spcAft>
+            </a:pPr>
+            <a:r>
+              <a:rPr sz="1200" b="1" dirty="0">
+                <a:solidFill>
+                  <a:srgbClr val="616161"/>
+                </a:solidFill>
+                <a:latin typeface="Montserrat"/>
+              </a:rPr>
+              <a:t>Rabat, Maroc</a:t>
+            </a:r>
+          </a:p>
+        </p:txBody>
+      </p:sp>
+      <p:pic>
+        <p:nvPicPr>
+          <p:cNvPr id="19" name="Picture 9" descr="image.png">
+            <a:extLst>
+              <a:ext uri="{FF2B5EF4-FFF2-40B4-BE49-F238E27FC236}">
+                <a16:creationId xmlns:a16="http://schemas.microsoft.com/office/drawing/2014/main" id="{6BE18F11-DDF8-FFD8-30FA-EDA73EC84848}"/>
+              </a:ext>
+            </a:extLst>
+          </p:cNvPr>
+          <p:cNvPicPr>
+            <a:picLocks noChangeAspect="1"/>
+          </p:cNvPicPr>
+          <p:nvPr/>
+        </p:nvPicPr>
+        <p:blipFill>
+          <a:blip r:embed="rId4">
+            <a:alphaModFix/>
+            <a:duotone>
+              <a:prstClr val="black"/>
+              <a:srgbClr val="42A5F5">
+                <a:tint val="45000"/>
+                <a:satMod val="400000"/>
+              </a:srgbClr>
+            </a:duotone>
+          </a:blip>
+          <a:stretch>
+            <a:fillRect/>
+          </a:stretch>
+        </p:blipFill>
+        <p:spPr>
+          <a:xfrm>
+            <a:off x="601946" y="5741685"/>
+            <a:ext cx="123821" cy="142875"/>
+          </a:xfrm>
+          <a:prstGeom prst="rect">
+            <a:avLst/>
+          </a:prstGeom>
+        </p:spPr>
+      </p:pic>
+      <p:sp>
+        <p:nvSpPr>
+          <p:cNvPr id="20" name="TextBox 10">
+            <a:extLst>
+              <a:ext uri="{FF2B5EF4-FFF2-40B4-BE49-F238E27FC236}">
+                <a16:creationId xmlns:a16="http://schemas.microsoft.com/office/drawing/2014/main" id="{8F21C5E2-5765-C028-732B-0BC15DB83625}"/>
+              </a:ext>
+            </a:extLst>
+          </p:cNvPr>
+          <p:cNvSpPr txBox="1"/>
+          <p:nvPr/>
+        </p:nvSpPr>
+        <p:spPr>
+          <a:xfrm>
+            <a:off x="821016" y="5667955"/>
+            <a:ext cx="1991186" cy="290336"/>
+          </a:xfrm>
+          <a:prstGeom prst="rect">
+            <a:avLst/>
+          </a:prstGeom>
+          <a:noFill/>
+        </p:spPr>
+        <p:txBody>
+          <a:bodyPr wrap="none" lIns="73152" tIns="54864" rIns="73152" bIns="54864" anchor="ctr">
+            <a:spAutoFit/>
+          </a:bodyPr>
+          <a:lstStyle/>
+          <a:p>
+            <a:pPr algn="l">
+              <a:lnSpc>
+                <a:spcPts val="1430"/>
+              </a:lnSpc>
+              <a:spcBef>
+                <a:spcPts val="0"/>
+              </a:spcBef>
+              <a:spcAft>
+                <a:spcPts val="0"/>
+              </a:spcAft>
+            </a:pPr>
+            <a:r>
+              <a:rPr lang="fr-FR" sz="1200" b="1" dirty="0">
+                <a:solidFill>
+                  <a:srgbClr val="616161"/>
+                </a:solidFill>
+                <a:latin typeface="Montserrat"/>
+              </a:rPr>
+              <a:t>LAMKHANTAR Youssef</a:t>
+            </a:r>
+            <a:endParaRPr sz="1200" b="1" dirty="0">
+              <a:solidFill>
+                <a:srgbClr val="616161"/>
+              </a:solidFill>
+              <a:latin typeface="Montserrat"/>
+            </a:endParaRPr>
+          </a:p>
+        </p:txBody>
+      </p:sp>
+      <p:pic>
+        <p:nvPicPr>
+          <p:cNvPr id="22" name="Picture 12" descr="image.png">
+            <a:extLst>
+              <a:ext uri="{FF2B5EF4-FFF2-40B4-BE49-F238E27FC236}">
+                <a16:creationId xmlns:a16="http://schemas.microsoft.com/office/drawing/2014/main" id="{9F6EFE4D-1720-1B40-8F42-F9B9C5431EBC}"/>
+              </a:ext>
+            </a:extLst>
+          </p:cNvPr>
+          <p:cNvPicPr>
+            <a:picLocks noChangeAspect="1"/>
+          </p:cNvPicPr>
+          <p:nvPr/>
+        </p:nvPicPr>
+        <p:blipFill>
+          <a:blip r:embed="rId5">
+            <a:alphaModFix/>
+            <a:duotone>
+              <a:prstClr val="black"/>
+              <a:srgbClr val="42A5F5">
+                <a:tint val="45000"/>
+                <a:satMod val="400000"/>
+              </a:srgbClr>
+            </a:duotone>
+          </a:blip>
+          <a:stretch>
+            <a:fillRect/>
+          </a:stretch>
+        </p:blipFill>
+        <p:spPr>
+          <a:xfrm>
+            <a:off x="3143642" y="5746043"/>
+            <a:ext cx="142871" cy="142875"/>
+          </a:xfrm>
+          <a:prstGeom prst="rect">
+            <a:avLst/>
+          </a:prstGeom>
+        </p:spPr>
+      </p:pic>
+      <p:sp>
+        <p:nvSpPr>
+          <p:cNvPr id="23" name="TextBox 13">
+            <a:extLst>
+              <a:ext uri="{FF2B5EF4-FFF2-40B4-BE49-F238E27FC236}">
+                <a16:creationId xmlns:a16="http://schemas.microsoft.com/office/drawing/2014/main" id="{198DEE7C-D8D6-497F-B647-3B9737DDD1A3}"/>
+              </a:ext>
+            </a:extLst>
+          </p:cNvPr>
+          <p:cNvSpPr txBox="1"/>
+          <p:nvPr/>
+        </p:nvSpPr>
+        <p:spPr>
+          <a:xfrm>
+            <a:off x="3381761" y="5672313"/>
+            <a:ext cx="1816459" cy="290336"/>
+          </a:xfrm>
+          <a:prstGeom prst="rect">
+            <a:avLst/>
+          </a:prstGeom>
+          <a:noFill/>
+        </p:spPr>
+        <p:txBody>
+          <a:bodyPr wrap="none" lIns="73152" tIns="54864" rIns="73152" bIns="54864" anchor="ctr">
+            <a:spAutoFit/>
+          </a:bodyPr>
+          <a:lstStyle/>
+          <a:p>
+            <a:pPr algn="l">
+              <a:lnSpc>
+                <a:spcPts val="1430"/>
+              </a:lnSpc>
+              <a:spcBef>
+                <a:spcPts val="0"/>
+              </a:spcBef>
+              <a:spcAft>
+                <a:spcPts val="0"/>
+              </a:spcAft>
+            </a:pPr>
+            <a:r>
+              <a:rPr sz="1200" b="1" dirty="0">
+                <a:solidFill>
+                  <a:srgbClr val="616161"/>
+                </a:solidFill>
+                <a:latin typeface="Montserrat"/>
+              </a:rPr>
+              <a:t>Master 1 ISI - SUPMTI</a:t>
+            </a:r>
+          </a:p>
+        </p:txBody>
+      </p:sp>
+      <p:pic>
+        <p:nvPicPr>
+          <p:cNvPr id="25" name="Picture 15" descr="image.png">
+            <a:extLst>
+              <a:ext uri="{FF2B5EF4-FFF2-40B4-BE49-F238E27FC236}">
+                <a16:creationId xmlns:a16="http://schemas.microsoft.com/office/drawing/2014/main" id="{7A6FA493-8D99-9457-804F-6304D78075E7}"/>
+              </a:ext>
+            </a:extLst>
+          </p:cNvPr>
+          <p:cNvPicPr>
+            <a:picLocks noChangeAspect="1"/>
+          </p:cNvPicPr>
+          <p:nvPr/>
+        </p:nvPicPr>
+        <p:blipFill>
+          <a:blip r:embed="rId6">
+            <a:alphaModFix/>
+            <a:duotone>
+              <a:prstClr val="black"/>
+              <a:srgbClr val="42A5F5">
+                <a:tint val="45000"/>
+                <a:satMod val="400000"/>
+              </a:srgbClr>
+            </a:duotone>
+          </a:blip>
+          <a:stretch>
+            <a:fillRect/>
+          </a:stretch>
+        </p:blipFill>
+        <p:spPr>
+          <a:xfrm>
+            <a:off x="5530742" y="5756203"/>
+            <a:ext cx="104772" cy="142875"/>
+          </a:xfrm>
+          <a:prstGeom prst="rect">
+            <a:avLst/>
+          </a:prstGeom>
+        </p:spPr>
+      </p:pic>
+      <p:sp>
+        <p:nvSpPr>
+          <p:cNvPr id="26" name="TextBox 16">
+            <a:extLst>
+              <a:ext uri="{FF2B5EF4-FFF2-40B4-BE49-F238E27FC236}">
+                <a16:creationId xmlns:a16="http://schemas.microsoft.com/office/drawing/2014/main" id="{71271453-9BBA-8F17-DD15-C3C403FED572}"/>
+              </a:ext>
+            </a:extLst>
+          </p:cNvPr>
+          <p:cNvSpPr txBox="1"/>
+          <p:nvPr/>
+        </p:nvSpPr>
+        <p:spPr>
+          <a:xfrm>
+            <a:off x="5730762" y="5682473"/>
+            <a:ext cx="1200906" cy="290336"/>
+          </a:xfrm>
+          <a:prstGeom prst="rect">
+            <a:avLst/>
+          </a:prstGeom>
+          <a:noFill/>
+        </p:spPr>
+        <p:txBody>
+          <a:bodyPr wrap="none" lIns="73152" tIns="54864" rIns="73152" bIns="54864" anchor="ctr">
+            <a:spAutoFit/>
+          </a:bodyPr>
+          <a:lstStyle/>
+          <a:p>
+            <a:pPr algn="l">
+              <a:lnSpc>
+                <a:spcPts val="1430"/>
+              </a:lnSpc>
+              <a:spcBef>
+                <a:spcPts val="0"/>
+              </a:spcBef>
+              <a:spcAft>
+                <a:spcPts val="0"/>
+              </a:spcAft>
+            </a:pPr>
+            <a:r>
+              <a:rPr sz="1200" b="1">
+                <a:solidFill>
+                  <a:srgbClr val="616161"/>
+                </a:solidFill>
+                <a:latin typeface="Montserrat"/>
+              </a:rPr>
+              <a:t>Rabat, Maroc</a:t>
+            </a:r>
+          </a:p>
+        </p:txBody>
+      </p:sp>
+      <p:pic>
+        <p:nvPicPr>
+          <p:cNvPr id="27" name="Picture 9" descr="image.png">
+            <a:extLst>
+              <a:ext uri="{FF2B5EF4-FFF2-40B4-BE49-F238E27FC236}">
+                <a16:creationId xmlns:a16="http://schemas.microsoft.com/office/drawing/2014/main" id="{67EC8201-A854-879D-3DE9-304F1E0E0B75}"/>
+              </a:ext>
+            </a:extLst>
+          </p:cNvPr>
+          <p:cNvPicPr>
+            <a:picLocks noChangeAspect="1"/>
+          </p:cNvPicPr>
+          <p:nvPr/>
+        </p:nvPicPr>
+        <p:blipFill>
+          <a:blip r:embed="rId4">
+            <a:alphaModFix/>
+            <a:duotone>
+              <a:prstClr val="black"/>
+              <a:srgbClr val="42A5F5">
+                <a:tint val="45000"/>
+                <a:satMod val="400000"/>
+              </a:srgbClr>
+            </a:duotone>
+          </a:blip>
+          <a:stretch>
+            <a:fillRect/>
+          </a:stretch>
+        </p:blipFill>
+        <p:spPr>
+          <a:xfrm>
+            <a:off x="601946" y="5986462"/>
+            <a:ext cx="123821" cy="142875"/>
+          </a:xfrm>
+          <a:prstGeom prst="rect">
+            <a:avLst/>
+          </a:prstGeom>
+        </p:spPr>
+      </p:pic>
+      <p:sp>
+        <p:nvSpPr>
+          <p:cNvPr id="28" name="TextBox 10">
+            <a:extLst>
+              <a:ext uri="{FF2B5EF4-FFF2-40B4-BE49-F238E27FC236}">
+                <a16:creationId xmlns:a16="http://schemas.microsoft.com/office/drawing/2014/main" id="{70A26E4B-8CF9-345F-2E58-7BB865C3F250}"/>
+              </a:ext>
+            </a:extLst>
+          </p:cNvPr>
+          <p:cNvSpPr txBox="1"/>
+          <p:nvPr/>
+        </p:nvSpPr>
+        <p:spPr>
+          <a:xfrm>
+            <a:off x="821016" y="5912732"/>
+            <a:ext cx="1968744" cy="290336"/>
+          </a:xfrm>
+          <a:prstGeom prst="rect">
+            <a:avLst/>
+          </a:prstGeom>
+          <a:noFill/>
+        </p:spPr>
+        <p:txBody>
+          <a:bodyPr wrap="none" lIns="73152" tIns="54864" rIns="73152" bIns="54864" anchor="ctr">
+            <a:spAutoFit/>
+          </a:bodyPr>
+          <a:lstStyle/>
+          <a:p>
+            <a:pPr algn="l">
+              <a:lnSpc>
+                <a:spcPts val="1430"/>
+              </a:lnSpc>
+              <a:spcBef>
+                <a:spcPts val="0"/>
+              </a:spcBef>
+              <a:spcAft>
+                <a:spcPts val="0"/>
+              </a:spcAft>
+            </a:pPr>
+            <a:r>
+              <a:rPr sz="1200" b="1" dirty="0">
+                <a:solidFill>
+                  <a:srgbClr val="616161"/>
+                </a:solidFill>
+                <a:latin typeface="Montserrat"/>
+              </a:rPr>
+              <a:t>MANI Mohammed Adil</a:t>
+            </a:r>
+          </a:p>
+        </p:txBody>
+      </p:sp>
+      <p:pic>
+        <p:nvPicPr>
+          <p:cNvPr id="30" name="Picture 12" descr="image.png">
+            <a:extLst>
+              <a:ext uri="{FF2B5EF4-FFF2-40B4-BE49-F238E27FC236}">
+                <a16:creationId xmlns:a16="http://schemas.microsoft.com/office/drawing/2014/main" id="{0AB20BE5-1366-A9D1-C635-D6DAADD1711D}"/>
+              </a:ext>
+            </a:extLst>
+          </p:cNvPr>
+          <p:cNvPicPr>
+            <a:picLocks noChangeAspect="1"/>
+          </p:cNvPicPr>
+          <p:nvPr/>
+        </p:nvPicPr>
+        <p:blipFill>
+          <a:blip r:embed="rId5">
+            <a:alphaModFix/>
+            <a:duotone>
+              <a:prstClr val="black"/>
+              <a:srgbClr val="42A5F5">
+                <a:tint val="45000"/>
+                <a:satMod val="400000"/>
+              </a:srgbClr>
+            </a:duotone>
+          </a:blip>
+          <a:stretch>
+            <a:fillRect/>
+          </a:stretch>
+        </p:blipFill>
+        <p:spPr>
+          <a:xfrm>
+            <a:off x="3143642" y="5990820"/>
+            <a:ext cx="142871" cy="142875"/>
+          </a:xfrm>
+          <a:prstGeom prst="rect">
+            <a:avLst/>
+          </a:prstGeom>
+        </p:spPr>
+      </p:pic>
+      <p:sp>
+        <p:nvSpPr>
+          <p:cNvPr id="31" name="TextBox 13">
+            <a:extLst>
+              <a:ext uri="{FF2B5EF4-FFF2-40B4-BE49-F238E27FC236}">
+                <a16:creationId xmlns:a16="http://schemas.microsoft.com/office/drawing/2014/main" id="{6E9EFE2D-7432-E1D7-8A47-2D864B52766B}"/>
+              </a:ext>
+            </a:extLst>
+          </p:cNvPr>
+          <p:cNvSpPr txBox="1"/>
+          <p:nvPr/>
+        </p:nvSpPr>
+        <p:spPr>
+          <a:xfrm>
+            <a:off x="3381761" y="5917090"/>
+            <a:ext cx="1816459" cy="290336"/>
+          </a:xfrm>
+          <a:prstGeom prst="rect">
+            <a:avLst/>
+          </a:prstGeom>
+          <a:noFill/>
+        </p:spPr>
+        <p:txBody>
+          <a:bodyPr wrap="none" lIns="73152" tIns="54864" rIns="73152" bIns="54864" anchor="ctr">
+            <a:spAutoFit/>
+          </a:bodyPr>
+          <a:lstStyle/>
+          <a:p>
+            <a:pPr algn="l">
+              <a:lnSpc>
+                <a:spcPts val="1430"/>
+              </a:lnSpc>
+              <a:spcBef>
+                <a:spcPts val="0"/>
+              </a:spcBef>
+              <a:spcAft>
+                <a:spcPts val="0"/>
+              </a:spcAft>
+            </a:pPr>
+            <a:r>
+              <a:rPr sz="1200" b="1" dirty="0">
+                <a:solidFill>
+                  <a:srgbClr val="616161"/>
+                </a:solidFill>
+                <a:latin typeface="Montserrat"/>
+              </a:rPr>
+              <a:t>Master 1 ISI - SUPMTI</a:t>
+            </a:r>
+          </a:p>
+        </p:txBody>
+      </p:sp>
+      <p:pic>
+        <p:nvPicPr>
+          <p:cNvPr id="33" name="Picture 15" descr="image.png">
+            <a:extLst>
+              <a:ext uri="{FF2B5EF4-FFF2-40B4-BE49-F238E27FC236}">
+                <a16:creationId xmlns:a16="http://schemas.microsoft.com/office/drawing/2014/main" id="{E185047C-03B0-6BA4-3885-A8D2678AF046}"/>
+              </a:ext>
+            </a:extLst>
+          </p:cNvPr>
+          <p:cNvPicPr>
+            <a:picLocks noChangeAspect="1"/>
+          </p:cNvPicPr>
+          <p:nvPr/>
+        </p:nvPicPr>
+        <p:blipFill>
+          <a:blip r:embed="rId6">
+            <a:alphaModFix/>
+            <a:duotone>
+              <a:prstClr val="black"/>
+              <a:srgbClr val="42A5F5">
+                <a:tint val="45000"/>
+                <a:satMod val="400000"/>
+              </a:srgbClr>
+            </a:duotone>
+          </a:blip>
+          <a:stretch>
+            <a:fillRect/>
+          </a:stretch>
+        </p:blipFill>
+        <p:spPr>
+          <a:xfrm>
+            <a:off x="5530742" y="6000980"/>
+            <a:ext cx="104772" cy="142875"/>
+          </a:xfrm>
+          <a:prstGeom prst="rect">
+            <a:avLst/>
+          </a:prstGeom>
+        </p:spPr>
+      </p:pic>
+      <p:sp>
+        <p:nvSpPr>
+          <p:cNvPr id="34" name="TextBox 16">
+            <a:extLst>
+              <a:ext uri="{FF2B5EF4-FFF2-40B4-BE49-F238E27FC236}">
+                <a16:creationId xmlns:a16="http://schemas.microsoft.com/office/drawing/2014/main" id="{10856705-4BBB-1318-9B11-EAC13263CE9E}"/>
+              </a:ext>
+            </a:extLst>
+          </p:cNvPr>
+          <p:cNvSpPr txBox="1"/>
+          <p:nvPr/>
+        </p:nvSpPr>
+        <p:spPr>
+          <a:xfrm>
+            <a:off x="5730762" y="5927250"/>
+            <a:ext cx="1200906" cy="290336"/>
+          </a:xfrm>
+          <a:prstGeom prst="rect">
+            <a:avLst/>
+          </a:prstGeom>
+          <a:noFill/>
+        </p:spPr>
+        <p:txBody>
+          <a:bodyPr wrap="none" lIns="73152" tIns="54864" rIns="73152" bIns="54864" anchor="ctr">
+            <a:spAutoFit/>
+          </a:bodyPr>
+          <a:lstStyle/>
+          <a:p>
+            <a:pPr algn="l">
+              <a:lnSpc>
+                <a:spcPts val="1430"/>
+              </a:lnSpc>
+              <a:spcBef>
+                <a:spcPts val="0"/>
+              </a:spcBef>
+              <a:spcAft>
+                <a:spcPts val="0"/>
+              </a:spcAft>
+            </a:pPr>
+            <a:r>
+              <a:rPr sz="1200" b="1">
+                <a:solidFill>
+                  <a:srgbClr val="616161"/>
+                </a:solidFill>
+                <a:latin typeface="Montserrat"/>
+              </a:rPr>
+              <a:t>Rabat, Maroc</a:t>
+            </a:r>
+          </a:p>
+        </p:txBody>
+      </p:sp>
+      <p:pic>
+        <p:nvPicPr>
+          <p:cNvPr id="1026" name="Picture 2" descr="Aperçu - SupMTI">
+            <a:extLst>
+              <a:ext uri="{FF2B5EF4-FFF2-40B4-BE49-F238E27FC236}">
+                <a16:creationId xmlns:a16="http://schemas.microsoft.com/office/drawing/2014/main" id="{7C790388-CA73-09BB-0296-0B7B9DD3ADE9}"/>
+              </a:ext>
+            </a:extLst>
+          </p:cNvPr>
+          <p:cNvPicPr>
+            <a:picLocks noChangeAspect="1" noChangeArrowheads="1"/>
+          </p:cNvPicPr>
+          <p:nvPr/>
+        </p:nvPicPr>
+        <p:blipFill>
+          <a:blip r:embed="rId7">
+            <a:extLst>
+              <a:ext uri="{28A0092B-C50C-407E-A947-70E740481C1C}">
+                <a14:useLocalDpi xmlns:a14="http://schemas.microsoft.com/office/drawing/2010/main" val="0"/>
+              </a:ext>
+            </a:extLst>
+          </a:blip>
+          <a:srcRect/>
+          <a:stretch>
+            <a:fillRect/>
+          </a:stretch>
+        </p:blipFill>
+        <p:spPr bwMode="auto">
+          <a:xfrm>
+            <a:off x="470557" y="290056"/>
+            <a:ext cx="1973460" cy="1054226"/>
+          </a:xfrm>
+          <a:prstGeom prst="rect">
+            <a:avLst/>
+          </a:prstGeom>
+          <a:noFill/>
+          <a:extLst>
+            <a:ext uri="{909E8E84-426E-40DD-AFC4-6F175D3DCCD1}">
+              <a14:hiddenFill xmlns:a14="http://schemas.microsoft.com/office/drawing/2010/main">
+                <a:solidFill>
+                  <a:srgbClr val="FFFFFF"/>
+                </a:solidFill>
+              </a14:hiddenFill>
+            </a:ext>
+          </a:extLst>
+        </p:spPr>
+      </p:pic>
+      <p:sp>
+        <p:nvSpPr>
+          <p:cNvPr id="29" name="TextBox 16">
+            <a:extLst>
+              <a:ext uri="{FF2B5EF4-FFF2-40B4-BE49-F238E27FC236}">
+                <a16:creationId xmlns:a16="http://schemas.microsoft.com/office/drawing/2014/main" id="{D2AE3A84-28BF-896C-7BC7-3B8B949A146D}"/>
+              </a:ext>
+            </a:extLst>
+          </p:cNvPr>
+          <p:cNvSpPr txBox="1"/>
+          <p:nvPr/>
+        </p:nvSpPr>
+        <p:spPr>
+          <a:xfrm>
+            <a:off x="9501905" y="6150840"/>
+            <a:ext cx="2690095" cy="290336"/>
+          </a:xfrm>
+          <a:prstGeom prst="rect">
+            <a:avLst/>
+          </a:prstGeom>
+          <a:noFill/>
+        </p:spPr>
+        <p:txBody>
+          <a:bodyPr wrap="none" lIns="73152" tIns="54864" rIns="73152" bIns="54864" anchor="ctr">
+            <a:spAutoFit/>
+          </a:bodyPr>
+          <a:lstStyle/>
+          <a:p>
+            <a:pPr algn="l">
+              <a:lnSpc>
+                <a:spcPts val="1430"/>
+              </a:lnSpc>
+              <a:spcBef>
+                <a:spcPts val="0"/>
+              </a:spcBef>
+              <a:spcAft>
+                <a:spcPts val="0"/>
+              </a:spcAft>
+            </a:pPr>
+            <a:r>
+              <a:rPr lang="fr-FR" sz="1200" b="1" dirty="0">
+                <a:solidFill>
+                  <a:srgbClr val="616161"/>
+                </a:solidFill>
+                <a:latin typeface="Montserrat"/>
+              </a:rPr>
+              <a:t>Année Universitaire : 2025/2026</a:t>
+            </a:r>
+            <a:endParaRPr sz="1200" b="1" dirty="0">
+              <a:solidFill>
+                <a:srgbClr val="616161"/>
+              </a:solidFill>
+              <a:latin typeface="Montserrat"/>
+            </a:endParaRPr>
+          </a:p>
+        </p:txBody>
+      </p:sp>
+      <p:sp>
+        <p:nvSpPr>
+          <p:cNvPr id="32" name="TextBox 16">
+            <a:extLst>
+              <a:ext uri="{FF2B5EF4-FFF2-40B4-BE49-F238E27FC236}">
+                <a16:creationId xmlns:a16="http://schemas.microsoft.com/office/drawing/2014/main" id="{B0EB4C3A-A21E-63C8-9385-F035AF485BE4}"/>
+              </a:ext>
+            </a:extLst>
+          </p:cNvPr>
+          <p:cNvSpPr txBox="1"/>
+          <p:nvPr/>
+        </p:nvSpPr>
+        <p:spPr>
+          <a:xfrm>
+            <a:off x="539042" y="4927024"/>
+            <a:ext cx="1407693" cy="290336"/>
+          </a:xfrm>
+          <a:prstGeom prst="rect">
+            <a:avLst/>
+          </a:prstGeom>
+          <a:noFill/>
+        </p:spPr>
+        <p:txBody>
+          <a:bodyPr wrap="none" lIns="73152" tIns="54864" rIns="73152" bIns="54864" anchor="ctr">
+            <a:spAutoFit/>
+          </a:bodyPr>
+          <a:lstStyle/>
+          <a:p>
+            <a:pPr algn="l">
+              <a:lnSpc>
+                <a:spcPts val="1430"/>
+              </a:lnSpc>
+              <a:spcBef>
+                <a:spcPts val="0"/>
+              </a:spcBef>
+              <a:spcAft>
+                <a:spcPts val="0"/>
+              </a:spcAft>
+            </a:pPr>
+            <a:r>
+              <a:rPr lang="fr-FR" sz="1200" b="1" dirty="0">
+                <a:solidFill>
+                  <a:srgbClr val="616161"/>
+                </a:solidFill>
+                <a:latin typeface="Montserrat"/>
+              </a:rPr>
+              <a:t>Présentée par : </a:t>
+            </a:r>
+            <a:endParaRPr sz="1200" b="1" dirty="0">
+              <a:solidFill>
+                <a:srgbClr val="616161"/>
+              </a:solidFill>
+              <a:latin typeface="Montserrat"/>
+            </a:endParaRPr>
+          </a:p>
+        </p:txBody>
+      </p:sp>
+      <p:sp>
+        <p:nvSpPr>
+          <p:cNvPr id="36" name="TextBox 16">
+            <a:extLst>
+              <a:ext uri="{FF2B5EF4-FFF2-40B4-BE49-F238E27FC236}">
+                <a16:creationId xmlns:a16="http://schemas.microsoft.com/office/drawing/2014/main" id="{138618A2-4019-890B-22CD-BE18A2A7A862}"/>
+              </a:ext>
+            </a:extLst>
+          </p:cNvPr>
+          <p:cNvSpPr txBox="1"/>
+          <p:nvPr/>
+        </p:nvSpPr>
+        <p:spPr>
+          <a:xfrm>
+            <a:off x="8776486" y="5028167"/>
+            <a:ext cx="1345176" cy="290336"/>
+          </a:xfrm>
+          <a:prstGeom prst="rect">
+            <a:avLst/>
+          </a:prstGeom>
+          <a:noFill/>
+        </p:spPr>
+        <p:txBody>
+          <a:bodyPr wrap="none" lIns="73152" tIns="54864" rIns="73152" bIns="54864" anchor="ctr">
+            <a:spAutoFit/>
+          </a:bodyPr>
+          <a:lstStyle/>
+          <a:p>
+            <a:pPr algn="l">
+              <a:lnSpc>
+                <a:spcPts val="1430"/>
+              </a:lnSpc>
+              <a:spcBef>
+                <a:spcPts val="0"/>
+              </a:spcBef>
+              <a:spcAft>
+                <a:spcPts val="0"/>
+              </a:spcAft>
+            </a:pPr>
+            <a:r>
+              <a:rPr lang="fr-FR" sz="1200" b="1" dirty="0">
+                <a:solidFill>
+                  <a:srgbClr val="616161"/>
+                </a:solidFill>
+                <a:latin typeface="Montserrat"/>
+              </a:rPr>
+              <a:t>Encadrée par : </a:t>
+            </a:r>
+            <a:endParaRPr sz="1200" b="1" dirty="0">
+              <a:solidFill>
+                <a:srgbClr val="616161"/>
+              </a:solidFill>
+              <a:latin typeface="Montserrat"/>
+            </a:endParaRPr>
+          </a:p>
+        </p:txBody>
+      </p:sp>
+      <p:pic>
+        <p:nvPicPr>
+          <p:cNvPr id="37" name="Picture 9" descr="image.png">
+            <a:extLst>
+              <a:ext uri="{FF2B5EF4-FFF2-40B4-BE49-F238E27FC236}">
+                <a16:creationId xmlns:a16="http://schemas.microsoft.com/office/drawing/2014/main" id="{62F8AB19-8CE2-C0C4-B2CA-1CC38C04579C}"/>
+              </a:ext>
+            </a:extLst>
+          </p:cNvPr>
+          <p:cNvPicPr>
+            <a:picLocks noChangeAspect="1"/>
+          </p:cNvPicPr>
+          <p:nvPr/>
+        </p:nvPicPr>
+        <p:blipFill>
+          <a:blip r:embed="rId4">
+            <a:alphaModFix/>
+            <a:duotone>
+              <a:prstClr val="black"/>
+              <a:srgbClr val="42A5F5">
+                <a:tint val="45000"/>
+                <a:satMod val="400000"/>
+              </a:srgbClr>
+            </a:duotone>
+          </a:blip>
+          <a:stretch>
+            <a:fillRect/>
+          </a:stretch>
+        </p:blipFill>
+        <p:spPr>
+          <a:xfrm>
+            <a:off x="8818682" y="5553478"/>
+            <a:ext cx="123821" cy="142875"/>
+          </a:xfrm>
+          <a:prstGeom prst="rect">
+            <a:avLst/>
+          </a:prstGeom>
+        </p:spPr>
+      </p:pic>
+      <p:sp>
+        <p:nvSpPr>
+          <p:cNvPr id="38" name="TextBox 10">
+            <a:extLst>
+              <a:ext uri="{FF2B5EF4-FFF2-40B4-BE49-F238E27FC236}">
+                <a16:creationId xmlns:a16="http://schemas.microsoft.com/office/drawing/2014/main" id="{74AB6FB3-1BC3-2FFC-C2B6-D289084AC30F}"/>
+              </a:ext>
+            </a:extLst>
+          </p:cNvPr>
+          <p:cNvSpPr txBox="1"/>
+          <p:nvPr/>
+        </p:nvSpPr>
+        <p:spPr>
+          <a:xfrm>
+            <a:off x="9037752" y="5479748"/>
+            <a:ext cx="1766766" cy="290336"/>
+          </a:xfrm>
+          <a:prstGeom prst="rect">
+            <a:avLst/>
+          </a:prstGeom>
+          <a:noFill/>
+        </p:spPr>
+        <p:txBody>
+          <a:bodyPr wrap="none" lIns="73152" tIns="54864" rIns="73152" bIns="54864" anchor="ctr">
+            <a:spAutoFit/>
+          </a:bodyPr>
+          <a:lstStyle/>
+          <a:p>
+            <a:pPr algn="l">
+              <a:lnSpc>
+                <a:spcPts val="1430"/>
+              </a:lnSpc>
+              <a:spcBef>
+                <a:spcPts val="0"/>
+              </a:spcBef>
+              <a:spcAft>
+                <a:spcPts val="0"/>
+              </a:spcAft>
+            </a:pPr>
+            <a:r>
+              <a:rPr lang="fr-FR" sz="1200" b="1" dirty="0" err="1">
+                <a:solidFill>
+                  <a:srgbClr val="616161"/>
+                </a:solidFill>
+                <a:latin typeface="Montserrat"/>
+              </a:rPr>
+              <a:t>Pr.ELALAMI</a:t>
+            </a:r>
+            <a:r>
+              <a:rPr lang="fr-FR" sz="1200" b="1" dirty="0">
+                <a:solidFill>
+                  <a:srgbClr val="616161"/>
+                </a:solidFill>
+                <a:latin typeface="Montserrat"/>
+              </a:rPr>
+              <a:t> YASSER</a:t>
+            </a:r>
+            <a:endParaRPr sz="1200" b="1" dirty="0">
+              <a:solidFill>
+                <a:srgbClr val="616161"/>
+              </a:solidFill>
+              <a:latin typeface="Montserrat"/>
+            </a:endParaRPr>
+          </a:p>
+        </p:txBody>
+      </p:sp>
+      <p:sp>
+        <p:nvSpPr>
+          <p:cNvPr id="39" name="Rounded Rectangle 6">
+            <a:extLst>
+              <a:ext uri="{FF2B5EF4-FFF2-40B4-BE49-F238E27FC236}">
+                <a16:creationId xmlns:a16="http://schemas.microsoft.com/office/drawing/2014/main" id="{A9D02373-72BB-E691-BC61-34B49A1BE5E1}"/>
+              </a:ext>
+            </a:extLst>
+          </p:cNvPr>
+          <p:cNvSpPr/>
+          <p:nvPr/>
+        </p:nvSpPr>
+        <p:spPr>
+          <a:xfrm rot="5400000">
+            <a:off x="937936" y="4880289"/>
+            <a:ext cx="57552" cy="731521"/>
+          </a:xfrm>
+          <a:prstGeom prst="roundRect">
+            <a:avLst>
+              <a:gd name="adj" fmla="val 100000"/>
+            </a:avLst>
+          </a:prstGeom>
+          <a:solidFill>
+            <a:srgbClr val="42A5F5"/>
+          </a:solidFill>
+          <a:ln>
+            <a:noFill/>
+          </a:ln>
+        </p:spPr>
+        <p:style>
+          <a:lnRef idx="1">
+            <a:schemeClr val="accent1"/>
+          </a:lnRef>
+          <a:fillRef idx="3">
+            <a:schemeClr val="accent1"/>
+          </a:fillRef>
+          <a:effectRef idx="2">
+            <a:schemeClr val="accent1"/>
+          </a:effectRef>
+          <a:fontRef idx="minor">
+            <a:schemeClr val="lt1"/>
+          </a:fontRef>
+        </p:style>
+        <p:txBody>
+          <a:bodyPr rtlCol="0" anchor="ctr"/>
+          <a:lstStyle/>
+          <a:p>
+            <a:pPr algn="ctr"/>
+            <a:endParaRPr/>
+          </a:p>
+        </p:txBody>
+      </p:sp>
+      <p:sp>
+        <p:nvSpPr>
+          <p:cNvPr id="40" name="Rounded Rectangle 6">
+            <a:extLst>
+              <a:ext uri="{FF2B5EF4-FFF2-40B4-BE49-F238E27FC236}">
+                <a16:creationId xmlns:a16="http://schemas.microsoft.com/office/drawing/2014/main" id="{D056D6D3-9883-B264-824D-17C22307DC46}"/>
+              </a:ext>
+            </a:extLst>
+          </p:cNvPr>
+          <p:cNvSpPr/>
+          <p:nvPr/>
+        </p:nvSpPr>
+        <p:spPr>
+          <a:xfrm rot="5400000">
+            <a:off x="9182536" y="5011481"/>
+            <a:ext cx="57552" cy="731521"/>
+          </a:xfrm>
+          <a:prstGeom prst="roundRect">
+            <a:avLst>
+              <a:gd name="adj" fmla="val 100000"/>
+            </a:avLst>
+          </a:prstGeom>
+          <a:solidFill>
+            <a:srgbClr val="42A5F5"/>
+          </a:solidFill>
+          <a:ln>
+            <a:noFill/>
+          </a:ln>
+        </p:spPr>
+        <p:style>
+          <a:lnRef idx="1">
+            <a:schemeClr val="accent1"/>
+          </a:lnRef>
+          <a:fillRef idx="3">
+            <a:schemeClr val="accent1"/>
+          </a:fillRef>
+          <a:effectRef idx="2">
+            <a:schemeClr val="accent1"/>
+          </a:effectRef>
+          <a:fontRef idx="minor">
+            <a:schemeClr val="lt1"/>
+          </a:fontRef>
+        </p:style>
+        <p:txBody>
+          <a:bodyPr rtlCol="0" anchor="ctr"/>
+          <a:lstStyle/>
+          <a:p>
+            <a:pPr algn="ctr"/>
+            <a:endParaRPr/>
+          </a:p>
+        </p:txBody>
+      </p:sp>
+    </p:spTree>
+    <p:extLst>
+      <p:ext uri="{BB962C8B-B14F-4D97-AF65-F5344CB8AC3E}">
+        <p14:creationId xmlns:p14="http://schemas.microsoft.com/office/powerpoint/2010/main" val="2081066736"/>
+      </p:ext>
+    </p:extLst>
   </p:cSld>
   <p:clrMapOvr>
     <a:masterClrMapping/>

</xml_diff>